<commit_message>
outlined ppt, completed methodology, and cleaned workbook code
</commit_message>
<xml_diff>
--- a/Presentation.pptx
+++ b/Presentation.pptx
@@ -8,7 +8,12 @@
     <p:sldId id="256" r:id="rId2"/>
     <p:sldId id="257" r:id="rId3"/>
     <p:sldId id="258" r:id="rId4"/>
-    <p:sldId id="259" r:id="rId5"/>
+    <p:sldId id="261" r:id="rId5"/>
+    <p:sldId id="263" r:id="rId6"/>
+    <p:sldId id="265" r:id="rId7"/>
+    <p:sldId id="268" r:id="rId8"/>
+    <p:sldId id="260" r:id="rId9"/>
+    <p:sldId id="259" r:id="rId10"/>
   </p:sldIdLst>
   <p:sldSz cx="9144000" cy="6858000" type="screen4x3"/>
   <p:notesSz cx="6858000" cy="9144000"/>
@@ -246,7 +251,7 @@
           <a:p>
             <a:fld id="{603EDBD2-4ACB-D941-B74D-BA5E97C7561D}" type="datetimeFigureOut">
               <a:rPr lang="en-US" smtClean="0"/>
-              <a:t>1/10/21</a:t>
+              <a:t>1/30/21</a:t>
             </a:fld>
             <a:endParaRPr lang="en-US"/>
           </a:p>
@@ -416,7 +421,7 @@
           <a:p>
             <a:fld id="{603EDBD2-4ACB-D941-B74D-BA5E97C7561D}" type="datetimeFigureOut">
               <a:rPr lang="en-US" smtClean="0"/>
-              <a:t>1/10/21</a:t>
+              <a:t>1/30/21</a:t>
             </a:fld>
             <a:endParaRPr lang="en-US"/>
           </a:p>
@@ -596,7 +601,7 @@
           <a:p>
             <a:fld id="{603EDBD2-4ACB-D941-B74D-BA5E97C7561D}" type="datetimeFigureOut">
               <a:rPr lang="en-US" smtClean="0"/>
-              <a:t>1/10/21</a:t>
+              <a:t>1/30/21</a:t>
             </a:fld>
             <a:endParaRPr lang="en-US"/>
           </a:p>
@@ -766,7 +771,7 @@
           <a:p>
             <a:fld id="{603EDBD2-4ACB-D941-B74D-BA5E97C7561D}" type="datetimeFigureOut">
               <a:rPr lang="en-US" smtClean="0"/>
-              <a:t>1/10/21</a:t>
+              <a:t>1/30/21</a:t>
             </a:fld>
             <a:endParaRPr lang="en-US"/>
           </a:p>
@@ -1010,7 +1015,7 @@
           <a:p>
             <a:fld id="{603EDBD2-4ACB-D941-B74D-BA5E97C7561D}" type="datetimeFigureOut">
               <a:rPr lang="en-US" smtClean="0"/>
-              <a:t>1/10/21</a:t>
+              <a:t>1/30/21</a:t>
             </a:fld>
             <a:endParaRPr lang="en-US"/>
           </a:p>
@@ -1242,7 +1247,7 @@
           <a:p>
             <a:fld id="{603EDBD2-4ACB-D941-B74D-BA5E97C7561D}" type="datetimeFigureOut">
               <a:rPr lang="en-US" smtClean="0"/>
-              <a:t>1/10/21</a:t>
+              <a:t>1/30/21</a:t>
             </a:fld>
             <a:endParaRPr lang="en-US"/>
           </a:p>
@@ -1609,7 +1614,7 @@
           <a:p>
             <a:fld id="{603EDBD2-4ACB-D941-B74D-BA5E97C7561D}" type="datetimeFigureOut">
               <a:rPr lang="en-US" smtClean="0"/>
-              <a:t>1/10/21</a:t>
+              <a:t>1/30/21</a:t>
             </a:fld>
             <a:endParaRPr lang="en-US"/>
           </a:p>
@@ -1727,7 +1732,7 @@
           <a:p>
             <a:fld id="{603EDBD2-4ACB-D941-B74D-BA5E97C7561D}" type="datetimeFigureOut">
               <a:rPr lang="en-US" smtClean="0"/>
-              <a:t>1/10/21</a:t>
+              <a:t>1/30/21</a:t>
             </a:fld>
             <a:endParaRPr lang="en-US"/>
           </a:p>
@@ -1822,7 +1827,7 @@
           <a:p>
             <a:fld id="{603EDBD2-4ACB-D941-B74D-BA5E97C7561D}" type="datetimeFigureOut">
               <a:rPr lang="en-US" smtClean="0"/>
-              <a:t>1/10/21</a:t>
+              <a:t>1/30/21</a:t>
             </a:fld>
             <a:endParaRPr lang="en-US"/>
           </a:p>
@@ -2099,7 +2104,7 @@
           <a:p>
             <a:fld id="{603EDBD2-4ACB-D941-B74D-BA5E97C7561D}" type="datetimeFigureOut">
               <a:rPr lang="en-US" smtClean="0"/>
-              <a:t>1/10/21</a:t>
+              <a:t>1/30/21</a:t>
             </a:fld>
             <a:endParaRPr lang="en-US"/>
           </a:p>
@@ -2356,7 +2361,7 @@
           <a:p>
             <a:fld id="{603EDBD2-4ACB-D941-B74D-BA5E97C7561D}" type="datetimeFigureOut">
               <a:rPr lang="en-US" smtClean="0"/>
-              <a:t>1/10/21</a:t>
+              <a:t>1/30/21</a:t>
             </a:fld>
             <a:endParaRPr lang="en-US"/>
           </a:p>
@@ -2569,7 +2574,7 @@
           <a:p>
             <a:fld id="{603EDBD2-4ACB-D941-B74D-BA5E97C7561D}" type="datetimeFigureOut">
               <a:rPr lang="en-US" smtClean="0"/>
-              <a:t>1/10/21</a:t>
+              <a:t>1/30/21</a:t>
             </a:fld>
             <a:endParaRPr lang="en-US"/>
           </a:p>
@@ -2992,8 +2997,8 @@
         </p:nvSpPr>
         <p:spPr>
           <a:xfrm>
-            <a:off x="1143000" y="1457739"/>
-            <a:ext cx="6858000" cy="1700680"/>
+            <a:off x="1386508" y="1457739"/>
+            <a:ext cx="6370983" cy="1700680"/>
           </a:xfrm>
         </p:spPr>
         <p:txBody>
@@ -3004,7 +3009,7 @@
           <a:p>
             <a:r>
               <a:rPr lang="en-US" dirty="0"/>
-              <a:t>Microsoft Film Recommendations</a:t>
+              <a:t>Microsoft Film Industry Analysis</a:t>
             </a:r>
           </a:p>
         </p:txBody>
@@ -3033,7 +3038,7 @@
         </p:spPr>
         <p:txBody>
           <a:bodyPr>
-            <a:normAutofit/>
+            <a:normAutofit lnSpcReduction="10000"/>
           </a:bodyPr>
           <a:lstStyle/>
           <a:p>
@@ -3045,7 +3050,21 @@
           <a:p>
             <a:r>
               <a:rPr lang="en-US" dirty="0"/>
-              <a:t>XX/XX/2021</a:t>
+              <a:t>February 1</a:t>
+            </a:r>
+            <a:r>
+              <a:rPr lang="en-US" baseline="30000" dirty="0"/>
+              <a:t>st</a:t>
+            </a:r>
+            <a:r>
+              <a:rPr lang="en-US" dirty="0"/>
+              <a:t>, 2021</a:t>
+            </a:r>
+          </a:p>
+          <a:p>
+            <a:r>
+              <a:rPr lang="en-US" dirty="0"/>
+              <a:t>Self-Paced</a:t>
             </a:r>
           </a:p>
         </p:txBody>
@@ -3101,7 +3120,10 @@
           <a:bodyPr/>
           <a:lstStyle/>
           <a:p>
-            <a:endParaRPr lang="en-US"/>
+            <a:r>
+              <a:rPr lang="en-US" dirty="0"/>
+              <a:t>Methodology</a:t>
+            </a:r>
           </a:p>
         </p:txBody>
       </p:sp>
@@ -3123,10 +3145,56 @@
         </p:nvSpPr>
         <p:spPr/>
         <p:txBody>
-          <a:bodyPr/>
-          <a:lstStyle/>
-          <a:p>
-            <a:endParaRPr lang="en-US"/>
+          <a:bodyPr>
+            <a:normAutofit/>
+          </a:bodyPr>
+          <a:lstStyle/>
+          <a:p>
+            <a:pPr marL="0" indent="0">
+              <a:buNone/>
+            </a:pPr>
+            <a:r>
+              <a:rPr lang="en-US" sz="2000" dirty="0"/>
+              <a:t>The following analysis was drawn from 8 different Excel files, which contained different datasets regarding films’ budgets, gross profits, popularity and more.</a:t>
+            </a:r>
+          </a:p>
+          <a:p>
+            <a:pPr marL="0" indent="0">
+              <a:buNone/>
+            </a:pPr>
+            <a:endParaRPr lang="en-US" sz="2000" dirty="0"/>
+          </a:p>
+          <a:p>
+            <a:pPr marL="0" indent="0">
+              <a:buNone/>
+            </a:pPr>
+            <a:r>
+              <a:rPr lang="en-US" sz="2000" dirty="0"/>
+              <a:t>For this analysis, the visualizations and calculations were executed using multiple Python libraries. These include Pandas, NumPy, and </a:t>
+            </a:r>
+            <a:r>
+              <a:rPr lang="en-US" sz="2000" dirty="0" err="1"/>
+              <a:t>MatPlotLib</a:t>
+            </a:r>
+            <a:r>
+              <a:rPr lang="en-US" sz="2000" dirty="0"/>
+              <a:t>.</a:t>
+            </a:r>
+          </a:p>
+          <a:p>
+            <a:pPr marL="0" indent="0">
+              <a:buNone/>
+            </a:pPr>
+            <a:endParaRPr lang="en-US" sz="2000" dirty="0"/>
+          </a:p>
+          <a:p>
+            <a:pPr marL="0" indent="0">
+              <a:buNone/>
+            </a:pPr>
+            <a:r>
+              <a:rPr lang="en-US" sz="2000" dirty="0"/>
+              <a:t>Additional resources used for research are included at the end of this presentation. </a:t>
+            </a:r>
           </a:p>
         </p:txBody>
       </p:sp>
@@ -3181,7 +3249,10 @@
           <a:bodyPr/>
           <a:lstStyle/>
           <a:p>
-            <a:endParaRPr lang="en-US"/>
+            <a:r>
+              <a:rPr lang="en-US" dirty="0"/>
+              <a:t>Intro</a:t>
+            </a:r>
           </a:p>
         </p:txBody>
       </p:sp>
@@ -3245,6 +3316,404 @@
           <p:cNvPr id="2" name="Title 1">
             <a:extLst>
               <a:ext uri="{FF2B5EF4-FFF2-40B4-BE49-F238E27FC236}">
+                <a16:creationId xmlns:a16="http://schemas.microsoft.com/office/drawing/2014/main" id="{2046E2A8-D1FA-1D48-8570-B9D2B4F1ECCD}"/>
+              </a:ext>
+            </a:extLst>
+          </p:cNvPr>
+          <p:cNvSpPr>
+            <a:spLocks noGrp="1"/>
+          </p:cNvSpPr>
+          <p:nvPr>
+            <p:ph type="title"/>
+          </p:nvPr>
+        </p:nvSpPr>
+        <p:spPr/>
+        <p:txBody>
+          <a:bodyPr/>
+          <a:lstStyle/>
+          <a:p>
+            <a:r>
+              <a:rPr lang="en-US" dirty="0"/>
+              <a:t>What are the most popular films?</a:t>
+            </a:r>
+          </a:p>
+        </p:txBody>
+      </p:sp>
+      <p:sp>
+        <p:nvSpPr>
+          <p:cNvPr id="3" name="Content Placeholder 2">
+            <a:extLst>
+              <a:ext uri="{FF2B5EF4-FFF2-40B4-BE49-F238E27FC236}">
+                <a16:creationId xmlns:a16="http://schemas.microsoft.com/office/drawing/2014/main" id="{60788684-69CE-9446-8F0F-1290C13A6B99}"/>
+              </a:ext>
+            </a:extLst>
+          </p:cNvPr>
+          <p:cNvSpPr>
+            <a:spLocks noGrp="1"/>
+          </p:cNvSpPr>
+          <p:nvPr>
+            <p:ph idx="1"/>
+          </p:nvPr>
+        </p:nvSpPr>
+        <p:spPr/>
+        <p:txBody>
+          <a:bodyPr/>
+          <a:lstStyle/>
+          <a:p>
+            <a:endParaRPr lang="en-US"/>
+          </a:p>
+        </p:txBody>
+      </p:sp>
+    </p:spTree>
+    <p:extLst>
+      <p:ext uri="{BB962C8B-B14F-4D97-AF65-F5344CB8AC3E}">
+        <p14:creationId xmlns:p14="http://schemas.microsoft.com/office/powerpoint/2010/main" val="4058587778"/>
+      </p:ext>
+    </p:extLst>
+  </p:cSld>
+  <p:clrMapOvr>
+    <a:masterClrMapping/>
+  </p:clrMapOvr>
+</p:sld>
+</file>
+
+<file path=ppt/slides/slide5.xml><?xml version="1.0" encoding="utf-8"?>
+<p:sld xmlns:a="http://schemas.openxmlformats.org/drawingml/2006/main" xmlns:r="http://schemas.openxmlformats.org/officeDocument/2006/relationships" xmlns:p="http://schemas.openxmlformats.org/presentationml/2006/main">
+  <p:cSld>
+    <p:spTree>
+      <p:nvGrpSpPr>
+        <p:cNvPr id="1" name=""/>
+        <p:cNvGrpSpPr/>
+        <p:nvPr/>
+      </p:nvGrpSpPr>
+      <p:grpSpPr>
+        <a:xfrm>
+          <a:off x="0" y="0"/>
+          <a:ext cx="0" cy="0"/>
+          <a:chOff x="0" y="0"/>
+          <a:chExt cx="0" cy="0"/>
+        </a:xfrm>
+      </p:grpSpPr>
+      <p:sp>
+        <p:nvSpPr>
+          <p:cNvPr id="2" name="Title 1">
+            <a:extLst>
+              <a:ext uri="{FF2B5EF4-FFF2-40B4-BE49-F238E27FC236}">
+                <a16:creationId xmlns:a16="http://schemas.microsoft.com/office/drawing/2014/main" id="{2046E2A8-D1FA-1D48-8570-B9D2B4F1ECCD}"/>
+              </a:ext>
+            </a:extLst>
+          </p:cNvPr>
+          <p:cNvSpPr>
+            <a:spLocks noGrp="1"/>
+          </p:cNvSpPr>
+          <p:nvPr>
+            <p:ph type="title"/>
+          </p:nvPr>
+        </p:nvSpPr>
+        <p:spPr/>
+        <p:txBody>
+          <a:bodyPr/>
+          <a:lstStyle/>
+          <a:p>
+            <a:r>
+              <a:rPr lang="en-US" dirty="0"/>
+              <a:t>What are the most lucrative films?</a:t>
+            </a:r>
+          </a:p>
+        </p:txBody>
+      </p:sp>
+      <p:sp>
+        <p:nvSpPr>
+          <p:cNvPr id="3" name="Content Placeholder 2">
+            <a:extLst>
+              <a:ext uri="{FF2B5EF4-FFF2-40B4-BE49-F238E27FC236}">
+                <a16:creationId xmlns:a16="http://schemas.microsoft.com/office/drawing/2014/main" id="{60788684-69CE-9446-8F0F-1290C13A6B99}"/>
+              </a:ext>
+            </a:extLst>
+          </p:cNvPr>
+          <p:cNvSpPr>
+            <a:spLocks noGrp="1"/>
+          </p:cNvSpPr>
+          <p:nvPr>
+            <p:ph idx="1"/>
+          </p:nvPr>
+        </p:nvSpPr>
+        <p:spPr/>
+        <p:txBody>
+          <a:bodyPr/>
+          <a:lstStyle/>
+          <a:p>
+            <a:endParaRPr lang="en-US"/>
+          </a:p>
+        </p:txBody>
+      </p:sp>
+    </p:spTree>
+    <p:extLst>
+      <p:ext uri="{BB962C8B-B14F-4D97-AF65-F5344CB8AC3E}">
+        <p14:creationId xmlns:p14="http://schemas.microsoft.com/office/powerpoint/2010/main" val="4270431863"/>
+      </p:ext>
+    </p:extLst>
+  </p:cSld>
+  <p:clrMapOvr>
+    <a:masterClrMapping/>
+  </p:clrMapOvr>
+</p:sld>
+</file>
+
+<file path=ppt/slides/slide6.xml><?xml version="1.0" encoding="utf-8"?>
+<p:sld xmlns:a="http://schemas.openxmlformats.org/drawingml/2006/main" xmlns:r="http://schemas.openxmlformats.org/officeDocument/2006/relationships" xmlns:p="http://schemas.openxmlformats.org/presentationml/2006/main">
+  <p:cSld>
+    <p:spTree>
+      <p:nvGrpSpPr>
+        <p:cNvPr id="1" name=""/>
+        <p:cNvGrpSpPr/>
+        <p:nvPr/>
+      </p:nvGrpSpPr>
+      <p:grpSpPr>
+        <a:xfrm>
+          <a:off x="0" y="0"/>
+          <a:ext cx="0" cy="0"/>
+          <a:chOff x="0" y="0"/>
+          <a:chExt cx="0" cy="0"/>
+        </a:xfrm>
+      </p:grpSpPr>
+      <p:sp>
+        <p:nvSpPr>
+          <p:cNvPr id="2" name="Title 1">
+            <a:extLst>
+              <a:ext uri="{FF2B5EF4-FFF2-40B4-BE49-F238E27FC236}">
+                <a16:creationId xmlns:a16="http://schemas.microsoft.com/office/drawing/2014/main" id="{2046E2A8-D1FA-1D48-8570-B9D2B4F1ECCD}"/>
+              </a:ext>
+            </a:extLst>
+          </p:cNvPr>
+          <p:cNvSpPr>
+            <a:spLocks noGrp="1"/>
+          </p:cNvSpPr>
+          <p:nvPr>
+            <p:ph type="title"/>
+          </p:nvPr>
+        </p:nvSpPr>
+        <p:spPr/>
+        <p:txBody>
+          <a:bodyPr/>
+          <a:lstStyle/>
+          <a:p>
+            <a:r>
+              <a:rPr lang="en-US" dirty="0"/>
+              <a:t>What are the most expensive films?</a:t>
+            </a:r>
+          </a:p>
+        </p:txBody>
+      </p:sp>
+      <p:sp>
+        <p:nvSpPr>
+          <p:cNvPr id="3" name="Content Placeholder 2">
+            <a:extLst>
+              <a:ext uri="{FF2B5EF4-FFF2-40B4-BE49-F238E27FC236}">
+                <a16:creationId xmlns:a16="http://schemas.microsoft.com/office/drawing/2014/main" id="{60788684-69CE-9446-8F0F-1290C13A6B99}"/>
+              </a:ext>
+            </a:extLst>
+          </p:cNvPr>
+          <p:cNvSpPr>
+            <a:spLocks noGrp="1"/>
+          </p:cNvSpPr>
+          <p:nvPr>
+            <p:ph idx="1"/>
+          </p:nvPr>
+        </p:nvSpPr>
+        <p:spPr/>
+        <p:txBody>
+          <a:bodyPr/>
+          <a:lstStyle/>
+          <a:p>
+            <a:endParaRPr lang="en-US" dirty="0"/>
+          </a:p>
+        </p:txBody>
+      </p:sp>
+    </p:spTree>
+    <p:extLst>
+      <p:ext uri="{BB962C8B-B14F-4D97-AF65-F5344CB8AC3E}">
+        <p14:creationId xmlns:p14="http://schemas.microsoft.com/office/powerpoint/2010/main" val="1021800676"/>
+      </p:ext>
+    </p:extLst>
+  </p:cSld>
+  <p:clrMapOvr>
+    <a:masterClrMapping/>
+  </p:clrMapOvr>
+</p:sld>
+</file>
+
+<file path=ppt/slides/slide7.xml><?xml version="1.0" encoding="utf-8"?>
+<p:sld xmlns:a="http://schemas.openxmlformats.org/drawingml/2006/main" xmlns:r="http://schemas.openxmlformats.org/officeDocument/2006/relationships" xmlns:p="http://schemas.openxmlformats.org/presentationml/2006/main">
+  <p:cSld>
+    <p:spTree>
+      <p:nvGrpSpPr>
+        <p:cNvPr id="1" name=""/>
+        <p:cNvGrpSpPr/>
+        <p:nvPr/>
+      </p:nvGrpSpPr>
+      <p:grpSpPr>
+        <a:xfrm>
+          <a:off x="0" y="0"/>
+          <a:ext cx="0" cy="0"/>
+          <a:chOff x="0" y="0"/>
+          <a:chExt cx="0" cy="0"/>
+        </a:xfrm>
+      </p:grpSpPr>
+      <p:sp>
+        <p:nvSpPr>
+          <p:cNvPr id="2" name="Title 1">
+            <a:extLst>
+              <a:ext uri="{FF2B5EF4-FFF2-40B4-BE49-F238E27FC236}">
+                <a16:creationId xmlns:a16="http://schemas.microsoft.com/office/drawing/2014/main" id="{2046E2A8-D1FA-1D48-8570-B9D2B4F1ECCD}"/>
+              </a:ext>
+            </a:extLst>
+          </p:cNvPr>
+          <p:cNvSpPr>
+            <a:spLocks noGrp="1"/>
+          </p:cNvSpPr>
+          <p:nvPr>
+            <p:ph type="title"/>
+          </p:nvPr>
+        </p:nvSpPr>
+        <p:spPr/>
+        <p:txBody>
+          <a:bodyPr/>
+          <a:lstStyle/>
+          <a:p>
+            <a:r>
+              <a:rPr lang="en-US" dirty="0"/>
+              <a:t>Recommendations</a:t>
+            </a:r>
+          </a:p>
+        </p:txBody>
+      </p:sp>
+      <p:sp>
+        <p:nvSpPr>
+          <p:cNvPr id="3" name="Content Placeholder 2">
+            <a:extLst>
+              <a:ext uri="{FF2B5EF4-FFF2-40B4-BE49-F238E27FC236}">
+                <a16:creationId xmlns:a16="http://schemas.microsoft.com/office/drawing/2014/main" id="{60788684-69CE-9446-8F0F-1290C13A6B99}"/>
+              </a:ext>
+            </a:extLst>
+          </p:cNvPr>
+          <p:cNvSpPr>
+            <a:spLocks noGrp="1"/>
+          </p:cNvSpPr>
+          <p:nvPr>
+            <p:ph idx="1"/>
+          </p:nvPr>
+        </p:nvSpPr>
+        <p:spPr/>
+        <p:txBody>
+          <a:bodyPr/>
+          <a:lstStyle/>
+          <a:p>
+            <a:endParaRPr lang="en-US"/>
+          </a:p>
+        </p:txBody>
+      </p:sp>
+    </p:spTree>
+    <p:extLst>
+      <p:ext uri="{BB962C8B-B14F-4D97-AF65-F5344CB8AC3E}">
+        <p14:creationId xmlns:p14="http://schemas.microsoft.com/office/powerpoint/2010/main" val="904231667"/>
+      </p:ext>
+    </p:extLst>
+  </p:cSld>
+  <p:clrMapOvr>
+    <a:masterClrMapping/>
+  </p:clrMapOvr>
+</p:sld>
+</file>
+
+<file path=ppt/slides/slide8.xml><?xml version="1.0" encoding="utf-8"?>
+<p:sld xmlns:a="http://schemas.openxmlformats.org/drawingml/2006/main" xmlns:r="http://schemas.openxmlformats.org/officeDocument/2006/relationships" xmlns:p="http://schemas.openxmlformats.org/presentationml/2006/main">
+  <p:cSld>
+    <p:spTree>
+      <p:nvGrpSpPr>
+        <p:cNvPr id="1" name=""/>
+        <p:cNvGrpSpPr/>
+        <p:nvPr/>
+      </p:nvGrpSpPr>
+      <p:grpSpPr>
+        <a:xfrm>
+          <a:off x="0" y="0"/>
+          <a:ext cx="0" cy="0"/>
+          <a:chOff x="0" y="0"/>
+          <a:chExt cx="0" cy="0"/>
+        </a:xfrm>
+      </p:grpSpPr>
+      <p:sp>
+        <p:nvSpPr>
+          <p:cNvPr id="6" name="TextBox 5">
+            <a:extLst>
+              <a:ext uri="{FF2B5EF4-FFF2-40B4-BE49-F238E27FC236}">
+                <a16:creationId xmlns:a16="http://schemas.microsoft.com/office/drawing/2014/main" id="{FEE1E8B8-EC92-7F47-A896-192BB0B85648}"/>
+              </a:ext>
+            </a:extLst>
+          </p:cNvPr>
+          <p:cNvSpPr txBox="1"/>
+          <p:nvPr/>
+        </p:nvSpPr>
+        <p:spPr>
+          <a:xfrm>
+            <a:off x="2208144" y="2686472"/>
+            <a:ext cx="4727712" cy="1107996"/>
+          </a:xfrm>
+          <a:prstGeom prst="rect">
+            <a:avLst/>
+          </a:prstGeom>
+          <a:noFill/>
+        </p:spPr>
+        <p:txBody>
+          <a:bodyPr wrap="square" rtlCol="0">
+            <a:spAutoFit/>
+          </a:bodyPr>
+          <a:lstStyle/>
+          <a:p>
+            <a:pPr algn="ctr"/>
+            <a:r>
+              <a:rPr lang="en-US" sz="6600" dirty="0"/>
+              <a:t>Thank You!!</a:t>
+            </a:r>
+          </a:p>
+        </p:txBody>
+      </p:sp>
+    </p:spTree>
+    <p:extLst>
+      <p:ext uri="{BB962C8B-B14F-4D97-AF65-F5344CB8AC3E}">
+        <p14:creationId xmlns:p14="http://schemas.microsoft.com/office/powerpoint/2010/main" val="2038972123"/>
+      </p:ext>
+    </p:extLst>
+  </p:cSld>
+  <p:clrMapOvr>
+    <a:masterClrMapping/>
+  </p:clrMapOvr>
+</p:sld>
+</file>
+
+<file path=ppt/slides/slide9.xml><?xml version="1.0" encoding="utf-8"?>
+<p:sld xmlns:a="http://schemas.openxmlformats.org/drawingml/2006/main" xmlns:r="http://schemas.openxmlformats.org/officeDocument/2006/relationships" xmlns:p="http://schemas.openxmlformats.org/presentationml/2006/main">
+  <p:cSld>
+    <p:spTree>
+      <p:nvGrpSpPr>
+        <p:cNvPr id="1" name=""/>
+        <p:cNvGrpSpPr/>
+        <p:nvPr/>
+      </p:nvGrpSpPr>
+      <p:grpSpPr>
+        <a:xfrm>
+          <a:off x="0" y="0"/>
+          <a:ext cx="0" cy="0"/>
+          <a:chOff x="0" y="0"/>
+          <a:chExt cx="0" cy="0"/>
+        </a:xfrm>
+      </p:grpSpPr>
+      <p:sp>
+        <p:nvSpPr>
+          <p:cNvPr id="2" name="Title 1">
+            <a:extLst>
+              <a:ext uri="{FF2B5EF4-FFF2-40B4-BE49-F238E27FC236}">
                 <a16:creationId xmlns:a16="http://schemas.microsoft.com/office/drawing/2014/main" id="{089195C1-7473-0141-A5DF-9758928671E1}"/>
               </a:ext>
             </a:extLst>
@@ -3261,7 +3730,10 @@
           <a:bodyPr/>
           <a:lstStyle/>
           <a:p>
-            <a:endParaRPr lang="en-US"/>
+            <a:r>
+              <a:rPr lang="en-US" dirty="0"/>
+              <a:t>Additional Resources</a:t>
+            </a:r>
           </a:p>
         </p:txBody>
       </p:sp>
@@ -3281,62 +3753,58 @@
             <p:ph idx="1"/>
           </p:nvPr>
         </p:nvSpPr>
-        <p:spPr/>
-        <p:txBody>
-          <a:bodyPr/>
-          <a:lstStyle/>
-          <a:p>
-            <a:endParaRPr lang="en-US" dirty="0"/>
-          </a:p>
-        </p:txBody>
-      </p:sp>
-      <p:sp>
-        <p:nvSpPr>
-          <p:cNvPr id="4" name="Rectangle 3">
-            <a:extLst>
-              <a:ext uri="{FF2B5EF4-FFF2-40B4-BE49-F238E27FC236}">
-                <a16:creationId xmlns:a16="http://schemas.microsoft.com/office/drawing/2014/main" id="{90412ACF-3413-364F-8412-B8A065AF55E8}"/>
-              </a:ext>
-            </a:extLst>
-          </p:cNvPr>
-          <p:cNvSpPr/>
-          <p:nvPr/>
-        </p:nvSpPr>
         <p:spPr>
           <a:xfrm>
-            <a:off x="748746" y="2575748"/>
-            <a:ext cx="7766604" cy="369332"/>
+            <a:off x="387212" y="1825625"/>
+            <a:ext cx="8369576" cy="4351338"/>
           </a:xfrm>
-          <a:prstGeom prst="rect">
-            <a:avLst/>
-          </a:prstGeom>
         </p:spPr>
         <p:txBody>
-          <a:bodyPr wrap="square">
-            <a:spAutoFit/>
-          </a:bodyPr>
-          <a:lstStyle/>
-          <a:p>
-            <a:r>
-              <a:rPr lang="en-US" dirty="0"/>
-              <a:t>https://</a:t>
-            </a:r>
-            <a:r>
-              <a:rPr lang="en-US" dirty="0" err="1"/>
-              <a:t>www.digitalspy.com</a:t>
-            </a:r>
-            <a:r>
-              <a:rPr lang="en-US" dirty="0"/>
-              <a:t>/movies/a870469/marvel-rights-characters-</a:t>
-            </a:r>
-            <a:r>
-              <a:rPr lang="en-US" dirty="0" err="1"/>
-              <a:t>disney</a:t>
-            </a:r>
-            <a:r>
-              <a:rPr lang="en-US" dirty="0"/>
-              <a:t>/</a:t>
-            </a:r>
+          <a:bodyPr/>
+          <a:lstStyle/>
+          <a:p>
+            <a:pPr marL="457200" indent="-457200">
+              <a:buAutoNum type="arabicParenR"/>
+            </a:pPr>
+            <a:r>
+              <a:rPr lang="en-US" sz="2000" dirty="0">
+                <a:hlinkClick r:id="rId2"/>
+              </a:rPr>
+              <a:t>https://www.digitalspy.com/movies/a870469/marvel-rights-characters-disney/</a:t>
+            </a:r>
+            <a:endParaRPr lang="en-US" sz="2000" dirty="0"/>
+          </a:p>
+          <a:p>
+            <a:pPr marL="457200" indent="-457200">
+              <a:buAutoNum type="arabicParenR"/>
+            </a:pPr>
+            <a:r>
+              <a:rPr lang="en-US" sz="2000" dirty="0" err="1"/>
+              <a:t>Zzzzzz</a:t>
+            </a:r>
+            <a:endParaRPr lang="en-US" sz="2000" dirty="0"/>
+          </a:p>
+          <a:p>
+            <a:pPr marL="457200" indent="-457200">
+              <a:buAutoNum type="arabicParenR"/>
+            </a:pPr>
+            <a:r>
+              <a:rPr lang="en-US" sz="2000" dirty="0" err="1"/>
+              <a:t>Xxxxxx</a:t>
+            </a:r>
+            <a:endParaRPr lang="en-US" sz="2000" dirty="0"/>
+          </a:p>
+          <a:p>
+            <a:pPr marL="457200" indent="-457200">
+              <a:buAutoNum type="arabicParenR"/>
+            </a:pPr>
+            <a:endParaRPr lang="en-US" sz="2000" dirty="0"/>
+          </a:p>
+          <a:p>
+            <a:pPr marL="0" indent="0">
+              <a:buNone/>
+            </a:pPr>
+            <a:endParaRPr lang="en-US" dirty="0"/>
           </a:p>
         </p:txBody>
       </p:sp>

</xml_diff>

<commit_message>
finished notebook, PPT Conclusion & Recommendation. Have 3 chart slides left
</commit_message>
<xml_diff>
--- a/Presentation.pptx
+++ b/Presentation.pptx
@@ -4,16 +4,21 @@
   <p:sldMasterIdLst>
     <p:sldMasterId id="2147483660" r:id="rId1"/>
   </p:sldMasterIdLst>
+  <p:notesMasterIdLst>
+    <p:notesMasterId r:id="rId13"/>
+  </p:notesMasterIdLst>
   <p:sldIdLst>
     <p:sldId id="256" r:id="rId2"/>
     <p:sldId id="257" r:id="rId3"/>
     <p:sldId id="258" r:id="rId4"/>
-    <p:sldId id="261" r:id="rId5"/>
-    <p:sldId id="263" r:id="rId6"/>
-    <p:sldId id="265" r:id="rId7"/>
-    <p:sldId id="268" r:id="rId8"/>
-    <p:sldId id="260" r:id="rId9"/>
-    <p:sldId id="259" r:id="rId10"/>
+    <p:sldId id="269" r:id="rId5"/>
+    <p:sldId id="261" r:id="rId6"/>
+    <p:sldId id="263" r:id="rId7"/>
+    <p:sldId id="265" r:id="rId8"/>
+    <p:sldId id="270" r:id="rId9"/>
+    <p:sldId id="268" r:id="rId10"/>
+    <p:sldId id="260" r:id="rId11"/>
+    <p:sldId id="259" r:id="rId12"/>
   </p:sldIdLst>
   <p:sldSz cx="9144000" cy="6858000" type="screen4x3"/>
   <p:notesSz cx="6858000" cy="9144000"/>
@@ -120,6 +125,554 @@
 </p:presentation>
 </file>
 
+<file path=ppt/notesMasters/notesMaster1.xml><?xml version="1.0" encoding="utf-8"?>
+<p:notesMaster xmlns:a="http://schemas.openxmlformats.org/drawingml/2006/main" xmlns:r="http://schemas.openxmlformats.org/officeDocument/2006/relationships" xmlns:p="http://schemas.openxmlformats.org/presentationml/2006/main">
+  <p:cSld>
+    <p:bg>
+      <p:bgRef idx="1001">
+        <a:schemeClr val="bg1"/>
+      </p:bgRef>
+    </p:bg>
+    <p:spTree>
+      <p:nvGrpSpPr>
+        <p:cNvPr id="1" name=""/>
+        <p:cNvGrpSpPr/>
+        <p:nvPr/>
+      </p:nvGrpSpPr>
+      <p:grpSpPr>
+        <a:xfrm>
+          <a:off x="0" y="0"/>
+          <a:ext cx="0" cy="0"/>
+          <a:chOff x="0" y="0"/>
+          <a:chExt cx="0" cy="0"/>
+        </a:xfrm>
+      </p:grpSpPr>
+      <p:sp>
+        <p:nvSpPr>
+          <p:cNvPr id="2" name="Header Placeholder 1"/>
+          <p:cNvSpPr>
+            <a:spLocks noGrp="1"/>
+          </p:cNvSpPr>
+          <p:nvPr>
+            <p:ph type="hdr" sz="quarter"/>
+          </p:nvPr>
+        </p:nvSpPr>
+        <p:spPr>
+          <a:xfrm>
+            <a:off x="0" y="0"/>
+            <a:ext cx="2971800" cy="458788"/>
+          </a:xfrm>
+          <a:prstGeom prst="rect">
+            <a:avLst/>
+          </a:prstGeom>
+        </p:spPr>
+        <p:txBody>
+          <a:bodyPr vert="horz" lIns="91440" tIns="45720" rIns="91440" bIns="45720" rtlCol="0"/>
+          <a:lstStyle>
+            <a:lvl1pPr algn="l">
+              <a:defRPr sz="1200"/>
+            </a:lvl1pPr>
+          </a:lstStyle>
+          <a:p>
+            <a:endParaRPr lang="en-US"/>
+          </a:p>
+        </p:txBody>
+      </p:sp>
+      <p:sp>
+        <p:nvSpPr>
+          <p:cNvPr id="3" name="Date Placeholder 2"/>
+          <p:cNvSpPr>
+            <a:spLocks noGrp="1"/>
+          </p:cNvSpPr>
+          <p:nvPr>
+            <p:ph type="dt" idx="1"/>
+          </p:nvPr>
+        </p:nvSpPr>
+        <p:spPr>
+          <a:xfrm>
+            <a:off x="3884613" y="0"/>
+            <a:ext cx="2971800" cy="458788"/>
+          </a:xfrm>
+          <a:prstGeom prst="rect">
+            <a:avLst/>
+          </a:prstGeom>
+        </p:spPr>
+        <p:txBody>
+          <a:bodyPr vert="horz" lIns="91440" tIns="45720" rIns="91440" bIns="45720" rtlCol="0"/>
+          <a:lstStyle>
+            <a:lvl1pPr algn="r">
+              <a:defRPr sz="1200"/>
+            </a:lvl1pPr>
+          </a:lstStyle>
+          <a:p>
+            <a:fld id="{72247FAF-F7CB-AD44-B55D-DFFEBBF4320B}" type="datetimeFigureOut">
+              <a:rPr lang="en-US" smtClean="0"/>
+              <a:t>1/31/21</a:t>
+            </a:fld>
+            <a:endParaRPr lang="en-US"/>
+          </a:p>
+        </p:txBody>
+      </p:sp>
+      <p:sp>
+        <p:nvSpPr>
+          <p:cNvPr id="4" name="Slide Image Placeholder 3"/>
+          <p:cNvSpPr>
+            <a:spLocks noGrp="1" noRot="1" noChangeAspect="1"/>
+          </p:cNvSpPr>
+          <p:nvPr>
+            <p:ph type="sldImg" idx="2"/>
+          </p:nvPr>
+        </p:nvSpPr>
+        <p:spPr>
+          <a:xfrm>
+            <a:off x="1371600" y="1143000"/>
+            <a:ext cx="4114800" cy="3086100"/>
+          </a:xfrm>
+          <a:prstGeom prst="rect">
+            <a:avLst/>
+          </a:prstGeom>
+          <a:noFill/>
+          <a:ln w="12700">
+            <a:solidFill>
+              <a:prstClr val="black"/>
+            </a:solidFill>
+          </a:ln>
+        </p:spPr>
+        <p:txBody>
+          <a:bodyPr vert="horz" lIns="91440" tIns="45720" rIns="91440" bIns="45720" rtlCol="0" anchor="ctr"/>
+          <a:lstStyle/>
+          <a:p>
+            <a:endParaRPr lang="en-US"/>
+          </a:p>
+        </p:txBody>
+      </p:sp>
+      <p:sp>
+        <p:nvSpPr>
+          <p:cNvPr id="5" name="Notes Placeholder 4"/>
+          <p:cNvSpPr>
+            <a:spLocks noGrp="1"/>
+          </p:cNvSpPr>
+          <p:nvPr>
+            <p:ph type="body" sz="quarter" idx="3"/>
+          </p:nvPr>
+        </p:nvSpPr>
+        <p:spPr>
+          <a:xfrm>
+            <a:off x="685800" y="4400550"/>
+            <a:ext cx="5486400" cy="3600450"/>
+          </a:xfrm>
+          <a:prstGeom prst="rect">
+            <a:avLst/>
+          </a:prstGeom>
+        </p:spPr>
+        <p:txBody>
+          <a:bodyPr vert="horz" lIns="91440" tIns="45720" rIns="91440" bIns="45720" rtlCol="0"/>
+          <a:lstStyle/>
+          <a:p>
+            <a:pPr lvl="0"/>
+            <a:r>
+              <a:rPr lang="en-US"/>
+              <a:t>Edit Master text styles</a:t>
+            </a:r>
+          </a:p>
+          <a:p>
+            <a:pPr lvl="1"/>
+            <a:r>
+              <a:rPr lang="en-US"/>
+              <a:t>Second level</a:t>
+            </a:r>
+          </a:p>
+          <a:p>
+            <a:pPr lvl="2"/>
+            <a:r>
+              <a:rPr lang="en-US"/>
+              <a:t>Third level</a:t>
+            </a:r>
+          </a:p>
+          <a:p>
+            <a:pPr lvl="3"/>
+            <a:r>
+              <a:rPr lang="en-US"/>
+              <a:t>Fourth level</a:t>
+            </a:r>
+          </a:p>
+          <a:p>
+            <a:pPr lvl="4"/>
+            <a:r>
+              <a:rPr lang="en-US"/>
+              <a:t>Fifth level</a:t>
+            </a:r>
+          </a:p>
+        </p:txBody>
+      </p:sp>
+      <p:sp>
+        <p:nvSpPr>
+          <p:cNvPr id="6" name="Footer Placeholder 5"/>
+          <p:cNvSpPr>
+            <a:spLocks noGrp="1"/>
+          </p:cNvSpPr>
+          <p:nvPr>
+            <p:ph type="ftr" sz="quarter" idx="4"/>
+          </p:nvPr>
+        </p:nvSpPr>
+        <p:spPr>
+          <a:xfrm>
+            <a:off x="0" y="8685213"/>
+            <a:ext cx="2971800" cy="458787"/>
+          </a:xfrm>
+          <a:prstGeom prst="rect">
+            <a:avLst/>
+          </a:prstGeom>
+        </p:spPr>
+        <p:txBody>
+          <a:bodyPr vert="horz" lIns="91440" tIns="45720" rIns="91440" bIns="45720" rtlCol="0" anchor="b"/>
+          <a:lstStyle>
+            <a:lvl1pPr algn="l">
+              <a:defRPr sz="1200"/>
+            </a:lvl1pPr>
+          </a:lstStyle>
+          <a:p>
+            <a:endParaRPr lang="en-US"/>
+          </a:p>
+        </p:txBody>
+      </p:sp>
+      <p:sp>
+        <p:nvSpPr>
+          <p:cNvPr id="7" name="Slide Number Placeholder 6"/>
+          <p:cNvSpPr>
+            <a:spLocks noGrp="1"/>
+          </p:cNvSpPr>
+          <p:nvPr>
+            <p:ph type="sldNum" sz="quarter" idx="5"/>
+          </p:nvPr>
+        </p:nvSpPr>
+        <p:spPr>
+          <a:xfrm>
+            <a:off x="3884613" y="8685213"/>
+            <a:ext cx="2971800" cy="458787"/>
+          </a:xfrm>
+          <a:prstGeom prst="rect">
+            <a:avLst/>
+          </a:prstGeom>
+        </p:spPr>
+        <p:txBody>
+          <a:bodyPr vert="horz" lIns="91440" tIns="45720" rIns="91440" bIns="45720" rtlCol="0" anchor="b"/>
+          <a:lstStyle>
+            <a:lvl1pPr algn="r">
+              <a:defRPr sz="1200"/>
+            </a:lvl1pPr>
+          </a:lstStyle>
+          <a:p>
+            <a:fld id="{C22212BE-518B-F647-A2C8-3E2CB39BC2C6}" type="slidenum">
+              <a:rPr lang="en-US" smtClean="0"/>
+              <a:t>‹#›</a:t>
+            </a:fld>
+            <a:endParaRPr lang="en-US"/>
+          </a:p>
+        </p:txBody>
+      </p:sp>
+    </p:spTree>
+    <p:extLst>
+      <p:ext uri="{BB962C8B-B14F-4D97-AF65-F5344CB8AC3E}">
+        <p14:creationId xmlns:p14="http://schemas.microsoft.com/office/powerpoint/2010/main" val="1906285510"/>
+      </p:ext>
+    </p:extLst>
+  </p:cSld>
+  <p:clrMap bg1="lt1" tx1="dk1" bg2="lt2" tx2="dk2" accent1="accent1" accent2="accent2" accent3="accent3" accent4="accent4" accent5="accent5" accent6="accent6" hlink="hlink" folHlink="folHlink"/>
+  <p:notesStyle>
+    <a:lvl1pPr marL="0" algn="l" defTabSz="914400" rtl="0" eaLnBrk="1" latinLnBrk="0" hangingPunct="1">
+      <a:defRPr sz="1200" kern="1200">
+        <a:solidFill>
+          <a:schemeClr val="tx1"/>
+        </a:solidFill>
+        <a:latin typeface="+mn-lt"/>
+        <a:ea typeface="+mn-ea"/>
+        <a:cs typeface="+mn-cs"/>
+      </a:defRPr>
+    </a:lvl1pPr>
+    <a:lvl2pPr marL="457200" algn="l" defTabSz="914400" rtl="0" eaLnBrk="1" latinLnBrk="0" hangingPunct="1">
+      <a:defRPr sz="1200" kern="1200">
+        <a:solidFill>
+          <a:schemeClr val="tx1"/>
+        </a:solidFill>
+        <a:latin typeface="+mn-lt"/>
+        <a:ea typeface="+mn-ea"/>
+        <a:cs typeface="+mn-cs"/>
+      </a:defRPr>
+    </a:lvl2pPr>
+    <a:lvl3pPr marL="914400" algn="l" defTabSz="914400" rtl="0" eaLnBrk="1" latinLnBrk="0" hangingPunct="1">
+      <a:defRPr sz="1200" kern="1200">
+        <a:solidFill>
+          <a:schemeClr val="tx1"/>
+        </a:solidFill>
+        <a:latin typeface="+mn-lt"/>
+        <a:ea typeface="+mn-ea"/>
+        <a:cs typeface="+mn-cs"/>
+      </a:defRPr>
+    </a:lvl3pPr>
+    <a:lvl4pPr marL="1371600" algn="l" defTabSz="914400" rtl="0" eaLnBrk="1" latinLnBrk="0" hangingPunct="1">
+      <a:defRPr sz="1200" kern="1200">
+        <a:solidFill>
+          <a:schemeClr val="tx1"/>
+        </a:solidFill>
+        <a:latin typeface="+mn-lt"/>
+        <a:ea typeface="+mn-ea"/>
+        <a:cs typeface="+mn-cs"/>
+      </a:defRPr>
+    </a:lvl4pPr>
+    <a:lvl5pPr marL="1828800" algn="l" defTabSz="914400" rtl="0" eaLnBrk="1" latinLnBrk="0" hangingPunct="1">
+      <a:defRPr sz="1200" kern="1200">
+        <a:solidFill>
+          <a:schemeClr val="tx1"/>
+        </a:solidFill>
+        <a:latin typeface="+mn-lt"/>
+        <a:ea typeface="+mn-ea"/>
+        <a:cs typeface="+mn-cs"/>
+      </a:defRPr>
+    </a:lvl5pPr>
+    <a:lvl6pPr marL="2286000" algn="l" defTabSz="914400" rtl="0" eaLnBrk="1" latinLnBrk="0" hangingPunct="1">
+      <a:defRPr sz="1200" kern="1200">
+        <a:solidFill>
+          <a:schemeClr val="tx1"/>
+        </a:solidFill>
+        <a:latin typeface="+mn-lt"/>
+        <a:ea typeface="+mn-ea"/>
+        <a:cs typeface="+mn-cs"/>
+      </a:defRPr>
+    </a:lvl6pPr>
+    <a:lvl7pPr marL="2743200" algn="l" defTabSz="914400" rtl="0" eaLnBrk="1" latinLnBrk="0" hangingPunct="1">
+      <a:defRPr sz="1200" kern="1200">
+        <a:solidFill>
+          <a:schemeClr val="tx1"/>
+        </a:solidFill>
+        <a:latin typeface="+mn-lt"/>
+        <a:ea typeface="+mn-ea"/>
+        <a:cs typeface="+mn-cs"/>
+      </a:defRPr>
+    </a:lvl7pPr>
+    <a:lvl8pPr marL="3200400" algn="l" defTabSz="914400" rtl="0" eaLnBrk="1" latinLnBrk="0" hangingPunct="1">
+      <a:defRPr sz="1200" kern="1200">
+        <a:solidFill>
+          <a:schemeClr val="tx1"/>
+        </a:solidFill>
+        <a:latin typeface="+mn-lt"/>
+        <a:ea typeface="+mn-ea"/>
+        <a:cs typeface="+mn-cs"/>
+      </a:defRPr>
+    </a:lvl8pPr>
+    <a:lvl9pPr marL="3657600" algn="l" defTabSz="914400" rtl="0" eaLnBrk="1" latinLnBrk="0" hangingPunct="1">
+      <a:defRPr sz="1200" kern="1200">
+        <a:solidFill>
+          <a:schemeClr val="tx1"/>
+        </a:solidFill>
+        <a:latin typeface="+mn-lt"/>
+        <a:ea typeface="+mn-ea"/>
+        <a:cs typeface="+mn-cs"/>
+      </a:defRPr>
+    </a:lvl9pPr>
+  </p:notesStyle>
+</p:notesMaster>
+</file>
+
+<file path=ppt/notesSlides/notesSlide1.xml><?xml version="1.0" encoding="utf-8"?>
+<p:notes xmlns:a="http://schemas.openxmlformats.org/drawingml/2006/main" xmlns:r="http://schemas.openxmlformats.org/officeDocument/2006/relationships" xmlns:p="http://schemas.openxmlformats.org/presentationml/2006/main">
+  <p:cSld>
+    <p:spTree>
+      <p:nvGrpSpPr>
+        <p:cNvPr id="1" name=""/>
+        <p:cNvGrpSpPr/>
+        <p:nvPr/>
+      </p:nvGrpSpPr>
+      <p:grpSpPr>
+        <a:xfrm>
+          <a:off x="0" y="0"/>
+          <a:ext cx="0" cy="0"/>
+          <a:chOff x="0" y="0"/>
+          <a:chExt cx="0" cy="0"/>
+        </a:xfrm>
+      </p:grpSpPr>
+      <p:sp>
+        <p:nvSpPr>
+          <p:cNvPr id="2" name="Slide Image Placeholder 1"/>
+          <p:cNvSpPr>
+            <a:spLocks noGrp="1" noRot="1" noChangeAspect="1"/>
+          </p:cNvSpPr>
+          <p:nvPr>
+            <p:ph type="sldImg"/>
+          </p:nvPr>
+        </p:nvSpPr>
+        <p:spPr/>
+      </p:sp>
+      <p:sp>
+        <p:nvSpPr>
+          <p:cNvPr id="3" name="Notes Placeholder 2"/>
+          <p:cNvSpPr>
+            <a:spLocks noGrp="1"/>
+          </p:cNvSpPr>
+          <p:nvPr>
+            <p:ph type="body" idx="1"/>
+          </p:nvPr>
+        </p:nvSpPr>
+        <p:spPr/>
+        <p:txBody>
+          <a:bodyPr/>
+          <a:lstStyle/>
+          <a:p>
+            <a:endParaRPr lang="en-US" dirty="0"/>
+          </a:p>
+        </p:txBody>
+      </p:sp>
+      <p:sp>
+        <p:nvSpPr>
+          <p:cNvPr id="4" name="Slide Number Placeholder 3"/>
+          <p:cNvSpPr>
+            <a:spLocks noGrp="1"/>
+          </p:cNvSpPr>
+          <p:nvPr>
+            <p:ph type="sldNum" sz="quarter" idx="5"/>
+          </p:nvPr>
+        </p:nvSpPr>
+        <p:spPr/>
+        <p:txBody>
+          <a:bodyPr/>
+          <a:lstStyle/>
+          <a:p>
+            <a:fld id="{C22212BE-518B-F647-A2C8-3E2CB39BC2C6}" type="slidenum">
+              <a:rPr lang="en-US" smtClean="0"/>
+              <a:t>8</a:t>
+            </a:fld>
+            <a:endParaRPr lang="en-US"/>
+          </a:p>
+        </p:txBody>
+      </p:sp>
+    </p:spTree>
+    <p:extLst>
+      <p:ext uri="{BB962C8B-B14F-4D97-AF65-F5344CB8AC3E}">
+        <p14:creationId xmlns:p14="http://schemas.microsoft.com/office/powerpoint/2010/main" val="1835484374"/>
+      </p:ext>
+    </p:extLst>
+  </p:cSld>
+  <p:clrMapOvr>
+    <a:masterClrMapping/>
+  </p:clrMapOvr>
+</p:notes>
+</file>
+
+<file path=ppt/notesSlides/notesSlide2.xml><?xml version="1.0" encoding="utf-8"?>
+<p:notes xmlns:a="http://schemas.openxmlformats.org/drawingml/2006/main" xmlns:r="http://schemas.openxmlformats.org/officeDocument/2006/relationships" xmlns:p="http://schemas.openxmlformats.org/presentationml/2006/main">
+  <p:cSld>
+    <p:spTree>
+      <p:nvGrpSpPr>
+        <p:cNvPr id="1" name=""/>
+        <p:cNvGrpSpPr/>
+        <p:nvPr/>
+      </p:nvGrpSpPr>
+      <p:grpSpPr>
+        <a:xfrm>
+          <a:off x="0" y="0"/>
+          <a:ext cx="0" cy="0"/>
+          <a:chOff x="0" y="0"/>
+          <a:chExt cx="0" cy="0"/>
+        </a:xfrm>
+      </p:grpSpPr>
+      <p:sp>
+        <p:nvSpPr>
+          <p:cNvPr id="2" name="Slide Image Placeholder 1"/>
+          <p:cNvSpPr>
+            <a:spLocks noGrp="1" noRot="1" noChangeAspect="1"/>
+          </p:cNvSpPr>
+          <p:nvPr>
+            <p:ph type="sldImg"/>
+          </p:nvPr>
+        </p:nvSpPr>
+        <p:spPr/>
+      </p:sp>
+      <p:sp>
+        <p:nvSpPr>
+          <p:cNvPr id="3" name="Notes Placeholder 2"/>
+          <p:cNvSpPr>
+            <a:spLocks noGrp="1"/>
+          </p:cNvSpPr>
+          <p:nvPr>
+            <p:ph type="body" idx="1"/>
+          </p:nvPr>
+        </p:nvSpPr>
+        <p:spPr/>
+        <p:txBody>
+          <a:bodyPr/>
+          <a:lstStyle/>
+          <a:p>
+            <a:pPr marL="0" marR="0" lvl="0" indent="0" algn="l" defTabSz="914400" rtl="0" eaLnBrk="1" fontAlgn="auto" latinLnBrk="0" hangingPunct="1">
+              <a:lnSpc>
+                <a:spcPct val="100000"/>
+              </a:lnSpc>
+              <a:spcBef>
+                <a:spcPts val="0"/>
+              </a:spcBef>
+              <a:spcAft>
+                <a:spcPts val="0"/>
+              </a:spcAft>
+              <a:buClrTx/>
+              <a:buSzTx/>
+              <a:buFontTx/>
+              <a:buNone/>
+              <a:tabLst/>
+              <a:defRPr/>
+            </a:pPr>
+            <a:r>
+              <a:rPr lang="en-US" dirty="0"/>
+              <a:t>Within the context of joining the film industry, I believe that Microsoft's most valuable asset is that roughly 50-60 million people own some kind of an Xbox device (original, 360, One, &amp; Series X). In this way, they are already in many peoples' </a:t>
+            </a:r>
+            <a:r>
+              <a:rPr lang="en-US" dirty="0" err="1"/>
+              <a:t>livingrooms</a:t>
+            </a:r>
+            <a:r>
+              <a:rPr lang="en-US" dirty="0"/>
+              <a:t>. As a result of this competitive advantage, there may be a lucrative solution for them, such as streaming, which seemingly has a smaller barrier to entry than filmmaking, but is still extremely competitive.</a:t>
+            </a:r>
+          </a:p>
+          <a:p>
+            <a:endParaRPr lang="en-US" dirty="0"/>
+          </a:p>
+        </p:txBody>
+      </p:sp>
+      <p:sp>
+        <p:nvSpPr>
+          <p:cNvPr id="4" name="Slide Number Placeholder 3"/>
+          <p:cNvSpPr>
+            <a:spLocks noGrp="1"/>
+          </p:cNvSpPr>
+          <p:nvPr>
+            <p:ph type="sldNum" sz="quarter" idx="5"/>
+          </p:nvPr>
+        </p:nvSpPr>
+        <p:spPr/>
+        <p:txBody>
+          <a:bodyPr/>
+          <a:lstStyle/>
+          <a:p>
+            <a:fld id="{C22212BE-518B-F647-A2C8-3E2CB39BC2C6}" type="slidenum">
+              <a:rPr lang="en-US" smtClean="0"/>
+              <a:t>9</a:t>
+            </a:fld>
+            <a:endParaRPr lang="en-US"/>
+          </a:p>
+        </p:txBody>
+      </p:sp>
+    </p:spTree>
+    <p:extLst>
+      <p:ext uri="{BB962C8B-B14F-4D97-AF65-F5344CB8AC3E}">
+        <p14:creationId xmlns:p14="http://schemas.microsoft.com/office/powerpoint/2010/main" val="761507273"/>
+      </p:ext>
+    </p:extLst>
+  </p:cSld>
+  <p:clrMapOvr>
+    <a:masterClrMapping/>
+  </p:clrMapOvr>
+</p:notes>
+</file>
+
 <file path=ppt/slideLayouts/slideLayout1.xml><?xml version="1.0" encoding="utf-8"?>
 <p:sldLayout xmlns:a="http://schemas.openxmlformats.org/drawingml/2006/main" xmlns:r="http://schemas.openxmlformats.org/officeDocument/2006/relationships" xmlns:p="http://schemas.openxmlformats.org/presentationml/2006/main" type="title" preserve="1">
   <p:cSld name="Title Slide">
@@ -251,7 +804,7 @@
           <a:p>
             <a:fld id="{603EDBD2-4ACB-D941-B74D-BA5E97C7561D}" type="datetimeFigureOut">
               <a:rPr lang="en-US" smtClean="0"/>
-              <a:t>1/30/21</a:t>
+              <a:t>1/31/21</a:t>
             </a:fld>
             <a:endParaRPr lang="en-US"/>
           </a:p>
@@ -421,7 +974,7 @@
           <a:p>
             <a:fld id="{603EDBD2-4ACB-D941-B74D-BA5E97C7561D}" type="datetimeFigureOut">
               <a:rPr lang="en-US" smtClean="0"/>
-              <a:t>1/30/21</a:t>
+              <a:t>1/31/21</a:t>
             </a:fld>
             <a:endParaRPr lang="en-US"/>
           </a:p>
@@ -601,7 +1154,7 @@
           <a:p>
             <a:fld id="{603EDBD2-4ACB-D941-B74D-BA5E97C7561D}" type="datetimeFigureOut">
               <a:rPr lang="en-US" smtClean="0"/>
-              <a:t>1/30/21</a:t>
+              <a:t>1/31/21</a:t>
             </a:fld>
             <a:endParaRPr lang="en-US"/>
           </a:p>
@@ -771,7 +1324,7 @@
           <a:p>
             <a:fld id="{603EDBD2-4ACB-D941-B74D-BA5E97C7561D}" type="datetimeFigureOut">
               <a:rPr lang="en-US" smtClean="0"/>
-              <a:t>1/30/21</a:t>
+              <a:t>1/31/21</a:t>
             </a:fld>
             <a:endParaRPr lang="en-US"/>
           </a:p>
@@ -1015,7 +1568,7 @@
           <a:p>
             <a:fld id="{603EDBD2-4ACB-D941-B74D-BA5E97C7561D}" type="datetimeFigureOut">
               <a:rPr lang="en-US" smtClean="0"/>
-              <a:t>1/30/21</a:t>
+              <a:t>1/31/21</a:t>
             </a:fld>
             <a:endParaRPr lang="en-US"/>
           </a:p>
@@ -1247,7 +1800,7 @@
           <a:p>
             <a:fld id="{603EDBD2-4ACB-D941-B74D-BA5E97C7561D}" type="datetimeFigureOut">
               <a:rPr lang="en-US" smtClean="0"/>
-              <a:t>1/30/21</a:t>
+              <a:t>1/31/21</a:t>
             </a:fld>
             <a:endParaRPr lang="en-US"/>
           </a:p>
@@ -1614,7 +2167,7 @@
           <a:p>
             <a:fld id="{603EDBD2-4ACB-D941-B74D-BA5E97C7561D}" type="datetimeFigureOut">
               <a:rPr lang="en-US" smtClean="0"/>
-              <a:t>1/30/21</a:t>
+              <a:t>1/31/21</a:t>
             </a:fld>
             <a:endParaRPr lang="en-US"/>
           </a:p>
@@ -1732,7 +2285,7 @@
           <a:p>
             <a:fld id="{603EDBD2-4ACB-D941-B74D-BA5E97C7561D}" type="datetimeFigureOut">
               <a:rPr lang="en-US" smtClean="0"/>
-              <a:t>1/30/21</a:t>
+              <a:t>1/31/21</a:t>
             </a:fld>
             <a:endParaRPr lang="en-US"/>
           </a:p>
@@ -1827,7 +2380,7 @@
           <a:p>
             <a:fld id="{603EDBD2-4ACB-D941-B74D-BA5E97C7561D}" type="datetimeFigureOut">
               <a:rPr lang="en-US" smtClean="0"/>
-              <a:t>1/30/21</a:t>
+              <a:t>1/31/21</a:t>
             </a:fld>
             <a:endParaRPr lang="en-US"/>
           </a:p>
@@ -2104,7 +2657,7 @@
           <a:p>
             <a:fld id="{603EDBD2-4ACB-D941-B74D-BA5E97C7561D}" type="datetimeFigureOut">
               <a:rPr lang="en-US" smtClean="0"/>
-              <a:t>1/30/21</a:t>
+              <a:t>1/31/21</a:t>
             </a:fld>
             <a:endParaRPr lang="en-US"/>
           </a:p>
@@ -2361,7 +2914,7 @@
           <a:p>
             <a:fld id="{603EDBD2-4ACB-D941-B74D-BA5E97C7561D}" type="datetimeFigureOut">
               <a:rPr lang="en-US" smtClean="0"/>
-              <a:t>1/30/21</a:t>
+              <a:t>1/31/21</a:t>
             </a:fld>
             <a:endParaRPr lang="en-US"/>
           </a:p>
@@ -2574,7 +3127,7 @@
           <a:p>
             <a:fld id="{603EDBD2-4ACB-D941-B74D-BA5E97C7561D}" type="datetimeFigureOut">
               <a:rPr lang="en-US" smtClean="0"/>
-              <a:t>1/30/21</a:t>
+              <a:t>1/31/21</a:t>
             </a:fld>
             <a:endParaRPr lang="en-US"/>
           </a:p>
@@ -3069,10 +3622,235 @@
           </a:p>
         </p:txBody>
       </p:sp>
+      <p:pic>
+        <p:nvPicPr>
+          <p:cNvPr id="5" name="Picture 4">
+            <a:extLst>
+              <a:ext uri="{FF2B5EF4-FFF2-40B4-BE49-F238E27FC236}">
+                <a16:creationId xmlns:a16="http://schemas.microsoft.com/office/drawing/2014/main" id="{36B426AB-9E62-3D48-B484-C927434FDE1F}"/>
+              </a:ext>
+            </a:extLst>
+          </p:cNvPr>
+          <p:cNvPicPr>
+            <a:picLocks noChangeAspect="1"/>
+          </p:cNvPicPr>
+          <p:nvPr/>
+        </p:nvPicPr>
+        <p:blipFill>
+          <a:blip r:embed="rId2"/>
+          <a:stretch>
+            <a:fillRect/>
+          </a:stretch>
+        </p:blipFill>
+        <p:spPr>
+          <a:xfrm>
+            <a:off x="112140" y="185237"/>
+            <a:ext cx="2061720" cy="1155148"/>
+          </a:xfrm>
+          <a:prstGeom prst="rect">
+            <a:avLst/>
+          </a:prstGeom>
+        </p:spPr>
+      </p:pic>
     </p:spTree>
     <p:extLst>
       <p:ext uri="{BB962C8B-B14F-4D97-AF65-F5344CB8AC3E}">
         <p14:creationId xmlns:p14="http://schemas.microsoft.com/office/powerpoint/2010/main" val="320112117"/>
+      </p:ext>
+    </p:extLst>
+  </p:cSld>
+  <p:clrMapOvr>
+    <a:masterClrMapping/>
+  </p:clrMapOvr>
+</p:sld>
+</file>
+
+<file path=ppt/slides/slide10.xml><?xml version="1.0" encoding="utf-8"?>
+<p:sld xmlns:a="http://schemas.openxmlformats.org/drawingml/2006/main" xmlns:r="http://schemas.openxmlformats.org/officeDocument/2006/relationships" xmlns:p="http://schemas.openxmlformats.org/presentationml/2006/main">
+  <p:cSld>
+    <p:spTree>
+      <p:nvGrpSpPr>
+        <p:cNvPr id="1" name=""/>
+        <p:cNvGrpSpPr/>
+        <p:nvPr/>
+      </p:nvGrpSpPr>
+      <p:grpSpPr>
+        <a:xfrm>
+          <a:off x="0" y="0"/>
+          <a:ext cx="0" cy="0"/>
+          <a:chOff x="0" y="0"/>
+          <a:chExt cx="0" cy="0"/>
+        </a:xfrm>
+      </p:grpSpPr>
+      <p:sp>
+        <p:nvSpPr>
+          <p:cNvPr id="6" name="TextBox 5">
+            <a:extLst>
+              <a:ext uri="{FF2B5EF4-FFF2-40B4-BE49-F238E27FC236}">
+                <a16:creationId xmlns:a16="http://schemas.microsoft.com/office/drawing/2014/main" id="{FEE1E8B8-EC92-7F47-A896-192BB0B85648}"/>
+              </a:ext>
+            </a:extLst>
+          </p:cNvPr>
+          <p:cNvSpPr txBox="1"/>
+          <p:nvPr/>
+        </p:nvSpPr>
+        <p:spPr>
+          <a:xfrm>
+            <a:off x="2208144" y="2686472"/>
+            <a:ext cx="4727712" cy="1107996"/>
+          </a:xfrm>
+          <a:prstGeom prst="rect">
+            <a:avLst/>
+          </a:prstGeom>
+          <a:noFill/>
+        </p:spPr>
+        <p:txBody>
+          <a:bodyPr wrap="square" rtlCol="0">
+            <a:spAutoFit/>
+          </a:bodyPr>
+          <a:lstStyle/>
+          <a:p>
+            <a:pPr algn="ctr"/>
+            <a:r>
+              <a:rPr lang="en-US" sz="6600" dirty="0"/>
+              <a:t>Thank You!!</a:t>
+            </a:r>
+          </a:p>
+        </p:txBody>
+      </p:sp>
+    </p:spTree>
+    <p:extLst>
+      <p:ext uri="{BB962C8B-B14F-4D97-AF65-F5344CB8AC3E}">
+        <p14:creationId xmlns:p14="http://schemas.microsoft.com/office/powerpoint/2010/main" val="2038972123"/>
+      </p:ext>
+    </p:extLst>
+  </p:cSld>
+  <p:clrMapOvr>
+    <a:masterClrMapping/>
+  </p:clrMapOvr>
+</p:sld>
+</file>
+
+<file path=ppt/slides/slide11.xml><?xml version="1.0" encoding="utf-8"?>
+<p:sld xmlns:a="http://schemas.openxmlformats.org/drawingml/2006/main" xmlns:r="http://schemas.openxmlformats.org/officeDocument/2006/relationships" xmlns:p="http://schemas.openxmlformats.org/presentationml/2006/main">
+  <p:cSld>
+    <p:spTree>
+      <p:nvGrpSpPr>
+        <p:cNvPr id="1" name=""/>
+        <p:cNvGrpSpPr/>
+        <p:nvPr/>
+      </p:nvGrpSpPr>
+      <p:grpSpPr>
+        <a:xfrm>
+          <a:off x="0" y="0"/>
+          <a:ext cx="0" cy="0"/>
+          <a:chOff x="0" y="0"/>
+          <a:chExt cx="0" cy="0"/>
+        </a:xfrm>
+      </p:grpSpPr>
+      <p:sp>
+        <p:nvSpPr>
+          <p:cNvPr id="2" name="Title 1">
+            <a:extLst>
+              <a:ext uri="{FF2B5EF4-FFF2-40B4-BE49-F238E27FC236}">
+                <a16:creationId xmlns:a16="http://schemas.microsoft.com/office/drawing/2014/main" id="{089195C1-7473-0141-A5DF-9758928671E1}"/>
+              </a:ext>
+            </a:extLst>
+          </p:cNvPr>
+          <p:cNvSpPr>
+            <a:spLocks noGrp="1"/>
+          </p:cNvSpPr>
+          <p:nvPr>
+            <p:ph type="title"/>
+          </p:nvPr>
+        </p:nvSpPr>
+        <p:spPr/>
+        <p:txBody>
+          <a:bodyPr/>
+          <a:lstStyle/>
+          <a:p>
+            <a:r>
+              <a:rPr lang="en-US" dirty="0"/>
+              <a:t>Additional Resources</a:t>
+            </a:r>
+          </a:p>
+        </p:txBody>
+      </p:sp>
+      <p:sp>
+        <p:nvSpPr>
+          <p:cNvPr id="3" name="Content Placeholder 2">
+            <a:extLst>
+              <a:ext uri="{FF2B5EF4-FFF2-40B4-BE49-F238E27FC236}">
+                <a16:creationId xmlns:a16="http://schemas.microsoft.com/office/drawing/2014/main" id="{861B0CCE-3644-F546-B6E1-F412405B0D18}"/>
+              </a:ext>
+            </a:extLst>
+          </p:cNvPr>
+          <p:cNvSpPr>
+            <a:spLocks noGrp="1"/>
+          </p:cNvSpPr>
+          <p:nvPr>
+            <p:ph idx="1"/>
+          </p:nvPr>
+        </p:nvSpPr>
+        <p:spPr>
+          <a:xfrm>
+            <a:off x="387212" y="1825625"/>
+            <a:ext cx="8369576" cy="4351338"/>
+          </a:xfrm>
+        </p:spPr>
+        <p:txBody>
+          <a:bodyPr/>
+          <a:lstStyle/>
+          <a:p>
+            <a:pPr marL="457200" indent="-457200">
+              <a:buAutoNum type="arabicParenR"/>
+            </a:pPr>
+            <a:r>
+              <a:rPr lang="en-US" sz="2000" dirty="0">
+                <a:hlinkClick r:id="rId2"/>
+              </a:rPr>
+              <a:t>https://www.digitalspy.com/movies/a870469/marvel-rights-characters-disney/</a:t>
+            </a:r>
+            <a:endParaRPr lang="en-US" sz="2000" dirty="0"/>
+          </a:p>
+          <a:p>
+            <a:pPr marL="457200" indent="-457200">
+              <a:buAutoNum type="arabicParenR"/>
+            </a:pPr>
+            <a:r>
+              <a:rPr lang="en-US" sz="2000" dirty="0" err="1"/>
+              <a:t>Zzzzzz</a:t>
+            </a:r>
+            <a:endParaRPr lang="en-US" sz="2000" dirty="0"/>
+          </a:p>
+          <a:p>
+            <a:pPr marL="457200" indent="-457200">
+              <a:buAutoNum type="arabicParenR"/>
+            </a:pPr>
+            <a:r>
+              <a:rPr lang="en-US" sz="2000" dirty="0" err="1"/>
+              <a:t>Xxxxxx</a:t>
+            </a:r>
+            <a:endParaRPr lang="en-US" sz="2000" dirty="0"/>
+          </a:p>
+          <a:p>
+            <a:pPr marL="457200" indent="-457200">
+              <a:buAutoNum type="arabicParenR"/>
+            </a:pPr>
+            <a:endParaRPr lang="en-US" sz="2000" dirty="0"/>
+          </a:p>
+          <a:p>
+            <a:pPr marL="0" indent="0">
+              <a:buNone/>
+            </a:pPr>
+            <a:endParaRPr lang="en-US" dirty="0"/>
+          </a:p>
+        </p:txBody>
+      </p:sp>
+    </p:spTree>
+    <p:extLst>
+      <p:ext uri="{BB962C8B-B14F-4D97-AF65-F5344CB8AC3E}">
+        <p14:creationId xmlns:p14="http://schemas.microsoft.com/office/powerpoint/2010/main" val="4015684761"/>
       </p:ext>
     </p:extLst>
   </p:cSld>
@@ -3155,7 +3933,7 @@
             </a:pPr>
             <a:r>
               <a:rPr lang="en-US" sz="2000" dirty="0"/>
-              <a:t>The following analysis was drawn from 8 different Excel files, which contained different datasets regarding films’ budgets, gross profits, popularity and more.</a:t>
+              <a:t>The following analysis was drawn from 8 different Excel files, which contained different datasets regarding films’ budgets, gross profits, popularity and more. The sources for these datasets include IMDB, The Movie Database and Box Office Mojo.</a:t>
             </a:r>
           </a:p>
           <a:p>
@@ -3170,7 +3948,7 @@
             </a:pPr>
             <a:r>
               <a:rPr lang="en-US" sz="2000" dirty="0"/>
-              <a:t>For this analysis, the visualizations and calculations were executed using multiple Python libraries. These include Pandas, NumPy, and </a:t>
+              <a:t>For this analysis, visualizations and calculations were executed using multiple Python libraries. These include Pandas, NumPy, and </a:t>
             </a:r>
             <a:r>
               <a:rPr lang="en-US" sz="2000" dirty="0" err="1"/>
@@ -3258,26 +4036,78 @@
       </p:sp>
       <p:sp>
         <p:nvSpPr>
-          <p:cNvPr id="3" name="Content Placeholder 2">
+          <p:cNvPr id="5" name="TextBox 4">
             <a:extLst>
               <a:ext uri="{FF2B5EF4-FFF2-40B4-BE49-F238E27FC236}">
-                <a16:creationId xmlns:a16="http://schemas.microsoft.com/office/drawing/2014/main" id="{60788684-69CE-9446-8F0F-1290C13A6B99}"/>
+                <a16:creationId xmlns:a16="http://schemas.microsoft.com/office/drawing/2014/main" id="{7BE26EEB-4E29-3749-9C4A-60AE4F345373}"/>
               </a:ext>
             </a:extLst>
           </p:cNvPr>
-          <p:cNvSpPr>
-            <a:spLocks noGrp="1"/>
-          </p:cNvSpPr>
-          <p:nvPr>
-            <p:ph idx="1"/>
-          </p:nvPr>
-        </p:nvSpPr>
-        <p:spPr/>
-        <p:txBody>
-          <a:bodyPr/>
-          <a:lstStyle/>
-          <a:p>
-            <a:endParaRPr lang="en-US"/>
+          <p:cNvSpPr txBox="1"/>
+          <p:nvPr/>
+        </p:nvSpPr>
+        <p:spPr>
+          <a:xfrm>
+            <a:off x="628650" y="1690689"/>
+            <a:ext cx="7023652" cy="3693319"/>
+          </a:xfrm>
+          <a:prstGeom prst="rect">
+            <a:avLst/>
+          </a:prstGeom>
+          <a:noFill/>
+        </p:spPr>
+        <p:txBody>
+          <a:bodyPr wrap="square" rtlCol="0">
+            <a:spAutoFit/>
+          </a:bodyPr>
+          <a:lstStyle/>
+          <a:p>
+            <a:r>
+              <a:rPr lang="en-US" b="1" dirty="0"/>
+              <a:t>Prompt: </a:t>
+            </a:r>
+            <a:r>
+              <a:rPr lang="en-US" dirty="0"/>
+              <a:t>Microsoft sees all the big companies creating original video content, and they want to get in on the fun. They have decided to create a new movie studio, but </a:t>
+            </a:r>
+            <a:r>
+              <a:rPr lang="en-US" u="sng" dirty="0">
+                <a:solidFill>
+                  <a:srgbClr val="0070C0"/>
+                </a:solidFill>
+              </a:rPr>
+              <a:t>the problem is they don’t know anything about creating movies</a:t>
+            </a:r>
+            <a:r>
+              <a:rPr lang="en-US" dirty="0">
+                <a:solidFill>
+                  <a:srgbClr val="0070C0"/>
+                </a:solidFill>
+              </a:rPr>
+              <a:t>. </a:t>
+            </a:r>
+          </a:p>
+          <a:p>
+            <a:endParaRPr lang="en-US" dirty="0"/>
+          </a:p>
+          <a:p>
+            <a:r>
+              <a:rPr lang="en-US" dirty="0"/>
+              <a:t>They have hired you to help them better understand the movie industry. Your team is charged with doing data analysis and creating a presentation that explores what type of films are currently doing the best at the box office. </a:t>
+            </a:r>
+          </a:p>
+          <a:p>
+            <a:endParaRPr lang="en-US" dirty="0"/>
+          </a:p>
+          <a:p>
+            <a:r>
+              <a:rPr lang="en-US" dirty="0"/>
+              <a:t>You must then translate those findings into actionable insights that the CEO can use when deciding what type of films they should be creating.</a:t>
+            </a:r>
+            <a:endParaRPr lang="en-US" sz="2000" dirty="0"/>
+          </a:p>
+          <a:p>
+            <a:endParaRPr lang="en-US" dirty="0"/>
           </a:p>
         </p:txBody>
       </p:sp>
@@ -3334,40 +4164,75 @@
           <a:p>
             <a:r>
               <a:rPr lang="en-US" dirty="0"/>
-              <a:t>What are the most popular films?</a:t>
-            </a:r>
-          </a:p>
-        </p:txBody>
-      </p:sp>
-      <p:sp>
-        <p:nvSpPr>
-          <p:cNvPr id="3" name="Content Placeholder 2">
+              <a:t>Table of Contents</a:t>
+            </a:r>
+          </a:p>
+        </p:txBody>
+      </p:sp>
+      <p:sp>
+        <p:nvSpPr>
+          <p:cNvPr id="5" name="TextBox 4">
             <a:extLst>
               <a:ext uri="{FF2B5EF4-FFF2-40B4-BE49-F238E27FC236}">
-                <a16:creationId xmlns:a16="http://schemas.microsoft.com/office/drawing/2014/main" id="{60788684-69CE-9446-8F0F-1290C13A6B99}"/>
+                <a16:creationId xmlns:a16="http://schemas.microsoft.com/office/drawing/2014/main" id="{7BE26EEB-4E29-3749-9C4A-60AE4F345373}"/>
               </a:ext>
             </a:extLst>
           </p:cNvPr>
-          <p:cNvSpPr>
-            <a:spLocks noGrp="1"/>
-          </p:cNvSpPr>
-          <p:nvPr>
-            <p:ph idx="1"/>
-          </p:nvPr>
-        </p:nvSpPr>
-        <p:spPr/>
-        <p:txBody>
-          <a:bodyPr/>
-          <a:lstStyle/>
-          <a:p>
-            <a:endParaRPr lang="en-US"/>
+          <p:cNvSpPr txBox="1"/>
+          <p:nvPr/>
+        </p:nvSpPr>
+        <p:spPr>
+          <a:xfrm>
+            <a:off x="628650" y="1831365"/>
+            <a:ext cx="7023652" cy="2677656"/>
+          </a:xfrm>
+          <a:prstGeom prst="rect">
+            <a:avLst/>
+          </a:prstGeom>
+          <a:noFill/>
+        </p:spPr>
+        <p:txBody>
+          <a:bodyPr wrap="square" rtlCol="0">
+            <a:spAutoFit/>
+          </a:bodyPr>
+          <a:lstStyle/>
+          <a:p>
+            <a:r>
+              <a:rPr lang="en-US" sz="2400" b="1" dirty="0"/>
+              <a:t>1) What are the most popular films?</a:t>
+            </a:r>
+            <a:endParaRPr lang="en-US" sz="2400" dirty="0"/>
+          </a:p>
+          <a:p>
+            <a:endParaRPr lang="en-US" sz="2400" dirty="0"/>
+          </a:p>
+          <a:p>
+            <a:endParaRPr lang="en-US" sz="2400" dirty="0"/>
+          </a:p>
+          <a:p>
+            <a:r>
+              <a:rPr lang="en-US" sz="2400" b="1" dirty="0"/>
+              <a:t>2) What are the most lucrative films?</a:t>
+            </a:r>
+          </a:p>
+          <a:p>
+            <a:endParaRPr lang="en-US" sz="2400" dirty="0"/>
+          </a:p>
+          <a:p>
+            <a:endParaRPr lang="en-US" sz="2400" dirty="0"/>
+          </a:p>
+          <a:p>
+            <a:r>
+              <a:rPr lang="en-US" sz="2400" b="1" dirty="0"/>
+              <a:t>3) What are the most expensive films?</a:t>
+            </a:r>
           </a:p>
         </p:txBody>
       </p:sp>
     </p:spTree>
     <p:extLst>
       <p:ext uri="{BB962C8B-B14F-4D97-AF65-F5344CB8AC3E}">
-        <p14:creationId xmlns:p14="http://schemas.microsoft.com/office/powerpoint/2010/main" val="4058587778"/>
+        <p14:creationId xmlns:p14="http://schemas.microsoft.com/office/powerpoint/2010/main" val="3343371438"/>
       </p:ext>
     </p:extLst>
   </p:cSld>
@@ -3417,7 +4282,7 @@
           <a:p>
             <a:r>
               <a:rPr lang="en-US" dirty="0"/>
-              <a:t>What are the most lucrative films?</a:t>
+              <a:t>What are the most popular films?</a:t>
             </a:r>
           </a:p>
         </p:txBody>
@@ -3443,14 +4308,14 @@
           <a:bodyPr/>
           <a:lstStyle/>
           <a:p>
-            <a:endParaRPr lang="en-US"/>
+            <a:endParaRPr lang="en-US" dirty="0"/>
           </a:p>
         </p:txBody>
       </p:sp>
     </p:spTree>
     <p:extLst>
       <p:ext uri="{BB962C8B-B14F-4D97-AF65-F5344CB8AC3E}">
-        <p14:creationId xmlns:p14="http://schemas.microsoft.com/office/powerpoint/2010/main" val="4270431863"/>
+        <p14:creationId xmlns:p14="http://schemas.microsoft.com/office/powerpoint/2010/main" val="4058587778"/>
       </p:ext>
     </p:extLst>
   </p:cSld>
@@ -3500,7 +4365,7 @@
           <a:p>
             <a:r>
               <a:rPr lang="en-US" dirty="0"/>
-              <a:t>What are the most expensive films?</a:t>
+              <a:t>What are the most lucrative films?</a:t>
             </a:r>
           </a:p>
         </p:txBody>
@@ -3526,14 +4391,14 @@
           <a:bodyPr/>
           <a:lstStyle/>
           <a:p>
-            <a:endParaRPr lang="en-US" dirty="0"/>
+            <a:endParaRPr lang="en-US"/>
           </a:p>
         </p:txBody>
       </p:sp>
     </p:spTree>
     <p:extLst>
       <p:ext uri="{BB962C8B-B14F-4D97-AF65-F5344CB8AC3E}">
-        <p14:creationId xmlns:p14="http://schemas.microsoft.com/office/powerpoint/2010/main" val="1021800676"/>
+        <p14:creationId xmlns:p14="http://schemas.microsoft.com/office/powerpoint/2010/main" val="4270431863"/>
       </p:ext>
     </p:extLst>
   </p:cSld>
@@ -3583,7 +4448,7 @@
           <a:p>
             <a:r>
               <a:rPr lang="en-US" dirty="0"/>
-              <a:t>Recommendations</a:t>
+              <a:t>What are the most expensive films?</a:t>
             </a:r>
           </a:p>
         </p:txBody>
@@ -3609,14 +4474,14 @@
           <a:bodyPr/>
           <a:lstStyle/>
           <a:p>
-            <a:endParaRPr lang="en-US"/>
+            <a:endParaRPr lang="en-US" dirty="0"/>
           </a:p>
         </p:txBody>
       </p:sp>
     </p:spTree>
     <p:extLst>
       <p:ext uri="{BB962C8B-B14F-4D97-AF65-F5344CB8AC3E}">
-        <p14:creationId xmlns:p14="http://schemas.microsoft.com/office/powerpoint/2010/main" val="904231667"/>
+        <p14:creationId xmlns:p14="http://schemas.microsoft.com/office/powerpoint/2010/main" val="1021800676"/>
       </p:ext>
     </p:extLst>
   </p:cSld>
@@ -3645,44 +4510,107 @@
       </p:grpSpPr>
       <p:sp>
         <p:nvSpPr>
-          <p:cNvPr id="6" name="TextBox 5">
+          <p:cNvPr id="2" name="Title 1">
             <a:extLst>
               <a:ext uri="{FF2B5EF4-FFF2-40B4-BE49-F238E27FC236}">
-                <a16:creationId xmlns:a16="http://schemas.microsoft.com/office/drawing/2014/main" id="{FEE1E8B8-EC92-7F47-A896-192BB0B85648}"/>
+                <a16:creationId xmlns:a16="http://schemas.microsoft.com/office/drawing/2014/main" id="{2046E2A8-D1FA-1D48-8570-B9D2B4F1ECCD}"/>
               </a:ext>
             </a:extLst>
           </p:cNvPr>
-          <p:cNvSpPr txBox="1"/>
-          <p:nvPr/>
+          <p:cNvSpPr>
+            <a:spLocks noGrp="1"/>
+          </p:cNvSpPr>
+          <p:nvPr>
+            <p:ph type="title"/>
+          </p:nvPr>
+        </p:nvSpPr>
+        <p:spPr/>
+        <p:txBody>
+          <a:bodyPr/>
+          <a:lstStyle/>
+          <a:p>
+            <a:r>
+              <a:rPr lang="en-US" dirty="0"/>
+              <a:t>Conclusion</a:t>
+            </a:r>
+          </a:p>
+        </p:txBody>
+      </p:sp>
+      <p:sp>
+        <p:nvSpPr>
+          <p:cNvPr id="3" name="Content Placeholder 2">
+            <a:extLst>
+              <a:ext uri="{FF2B5EF4-FFF2-40B4-BE49-F238E27FC236}">
+                <a16:creationId xmlns:a16="http://schemas.microsoft.com/office/drawing/2014/main" id="{60788684-69CE-9446-8F0F-1290C13A6B99}"/>
+              </a:ext>
+            </a:extLst>
+          </p:cNvPr>
+          <p:cNvSpPr>
+            <a:spLocks noGrp="1"/>
+          </p:cNvSpPr>
+          <p:nvPr>
+            <p:ph idx="1"/>
+          </p:nvPr>
         </p:nvSpPr>
         <p:spPr>
           <a:xfrm>
-            <a:off x="2208144" y="2686472"/>
-            <a:ext cx="4727712" cy="1107996"/>
+            <a:off x="628650" y="1825625"/>
+            <a:ext cx="7886700" cy="3994883"/>
           </a:xfrm>
-          <a:prstGeom prst="rect">
-            <a:avLst/>
-          </a:prstGeom>
-          <a:noFill/>
         </p:spPr>
         <p:txBody>
-          <a:bodyPr wrap="square" rtlCol="0">
-            <a:spAutoFit/>
+          <a:bodyPr>
+            <a:normAutofit fontScale="85000" lnSpcReduction="20000"/>
           </a:bodyPr>
           <a:lstStyle/>
           <a:p>
-            <a:pPr algn="ctr"/>
-            <a:r>
-              <a:rPr lang="en-US" sz="6600" dirty="0"/>
-              <a:t>Thank You!!</a:t>
-            </a:r>
+            <a:r>
+              <a:rPr lang="en-US" dirty="0"/>
+              <a:t>Microsoft does not own the intellectual property for any of the major film series that consistently make a large profit</a:t>
+            </a:r>
+          </a:p>
+          <a:p>
+            <a:endParaRPr lang="en-US" dirty="0"/>
+          </a:p>
+          <a:p>
+            <a:r>
+              <a:rPr lang="en-US" dirty="0"/>
+              <a:t>It is extremely expensive to create a movie that can be reliably successful</a:t>
+            </a:r>
+          </a:p>
+          <a:p>
+            <a:endParaRPr lang="en-US" dirty="0"/>
+          </a:p>
+          <a:p>
+            <a:r>
+              <a:rPr lang="en-US" dirty="0"/>
+              <a:t>Despite having sufficient capital to make competitive films, there is a significant opportunity cost to moving in a new direction</a:t>
+            </a:r>
+          </a:p>
+          <a:p>
+            <a:pPr marL="0" indent="0">
+              <a:buNone/>
+            </a:pPr>
+            <a:endParaRPr lang="en-US" dirty="0"/>
+          </a:p>
+          <a:p>
+            <a:r>
+              <a:rPr lang="en-US" dirty="0"/>
+              <a:t>There is a low chance of Microsoft creating a successful film on their own</a:t>
+            </a:r>
+          </a:p>
+          <a:p>
+            <a:endParaRPr lang="en-US" dirty="0"/>
+          </a:p>
+          <a:p>
+            <a:endParaRPr lang="en-US" dirty="0"/>
           </a:p>
         </p:txBody>
       </p:sp>
     </p:spTree>
     <p:extLst>
       <p:ext uri="{BB962C8B-B14F-4D97-AF65-F5344CB8AC3E}">
-        <p14:creationId xmlns:p14="http://schemas.microsoft.com/office/powerpoint/2010/main" val="2038972123"/>
+        <p14:creationId xmlns:p14="http://schemas.microsoft.com/office/powerpoint/2010/main" val="411621456"/>
       </p:ext>
     </p:extLst>
   </p:cSld>
@@ -3714,7 +4642,7 @@
           <p:cNvPr id="2" name="Title 1">
             <a:extLst>
               <a:ext uri="{FF2B5EF4-FFF2-40B4-BE49-F238E27FC236}">
-                <a16:creationId xmlns:a16="http://schemas.microsoft.com/office/drawing/2014/main" id="{089195C1-7473-0141-A5DF-9758928671E1}"/>
+                <a16:creationId xmlns:a16="http://schemas.microsoft.com/office/drawing/2014/main" id="{2046E2A8-D1FA-1D48-8570-B9D2B4F1ECCD}"/>
               </a:ext>
             </a:extLst>
           </p:cNvPr>
@@ -3732,7 +4660,7 @@
           <a:p>
             <a:r>
               <a:rPr lang="en-US" dirty="0"/>
-              <a:t>Additional Resources</a:t>
+              <a:t>Recommendations</a:t>
             </a:r>
           </a:p>
         </p:txBody>
@@ -3742,7 +4670,7 @@
           <p:cNvPr id="3" name="Content Placeholder 2">
             <a:extLst>
               <a:ext uri="{FF2B5EF4-FFF2-40B4-BE49-F238E27FC236}">
-                <a16:creationId xmlns:a16="http://schemas.microsoft.com/office/drawing/2014/main" id="{861B0CCE-3644-F546-B6E1-F412405B0D18}"/>
+                <a16:creationId xmlns:a16="http://schemas.microsoft.com/office/drawing/2014/main" id="{60788684-69CE-9446-8F0F-1290C13A6B99}"/>
               </a:ext>
             </a:extLst>
           </p:cNvPr>
@@ -3753,65 +4681,65 @@
             <p:ph idx="1"/>
           </p:nvPr>
         </p:nvSpPr>
-        <p:spPr>
-          <a:xfrm>
-            <a:off x="387212" y="1825625"/>
-            <a:ext cx="8369576" cy="4351338"/>
-          </a:xfrm>
-        </p:spPr>
-        <p:txBody>
-          <a:bodyPr/>
-          <a:lstStyle/>
-          <a:p>
-            <a:pPr marL="457200" indent="-457200">
-              <a:buAutoNum type="arabicParenR"/>
-            </a:pPr>
-            <a:r>
-              <a:rPr lang="en-US" sz="2000" dirty="0">
-                <a:hlinkClick r:id="rId2"/>
-              </a:rPr>
-              <a:t>https://www.digitalspy.com/movies/a870469/marvel-rights-characters-disney/</a:t>
-            </a:r>
-            <a:endParaRPr lang="en-US" sz="2000" dirty="0"/>
-          </a:p>
-          <a:p>
-            <a:pPr marL="457200" indent="-457200">
-              <a:buAutoNum type="arabicParenR"/>
-            </a:pPr>
-            <a:r>
-              <a:rPr lang="en-US" sz="2000" dirty="0" err="1"/>
-              <a:t>Zzzzzz</a:t>
-            </a:r>
-            <a:endParaRPr lang="en-US" sz="2000" dirty="0"/>
-          </a:p>
-          <a:p>
-            <a:pPr marL="457200" indent="-457200">
-              <a:buAutoNum type="arabicParenR"/>
-            </a:pPr>
-            <a:r>
-              <a:rPr lang="en-US" sz="2000" dirty="0" err="1"/>
-              <a:t>Xxxxxx</a:t>
-            </a:r>
-            <a:endParaRPr lang="en-US" sz="2000" dirty="0"/>
-          </a:p>
-          <a:p>
-            <a:pPr marL="457200" indent="-457200">
-              <a:buAutoNum type="arabicParenR"/>
-            </a:pPr>
-            <a:endParaRPr lang="en-US" sz="2000" dirty="0"/>
+        <p:spPr/>
+        <p:txBody>
+          <a:bodyPr>
+            <a:normAutofit fontScale="85000" lnSpcReduction="20000"/>
+          </a:bodyPr>
+          <a:lstStyle/>
+          <a:p>
+            <a:r>
+              <a:rPr lang="en-US" dirty="0"/>
+              <a:t>I recommend that Microsoft does not get involved in creating new movie content, nor streaming because it is too expensive and risky to take the chance. </a:t>
+            </a:r>
           </a:p>
           <a:p>
             <a:pPr marL="0" indent="0">
               <a:buNone/>
             </a:pPr>
             <a:endParaRPr lang="en-US" dirty="0"/>
+          </a:p>
+          <a:p>
+            <a:r>
+              <a:rPr lang="en-US" dirty="0"/>
+              <a:t>Microsoft should continue spending capital on trying to improve their other services that are already dominant, such as GitHub, Windows, Teams, etc. </a:t>
+            </a:r>
+          </a:p>
+          <a:p>
+            <a:pPr marL="0" indent="0">
+              <a:buNone/>
+            </a:pPr>
+            <a:endParaRPr lang="en-US" dirty="0"/>
+          </a:p>
+          <a:p>
+            <a:pPr marL="0" indent="0">
+              <a:buNone/>
+            </a:pPr>
+            <a:r>
+              <a:rPr lang="en-US" b="1" dirty="0"/>
+              <a:t>Something worth considering</a:t>
+            </a:r>
+          </a:p>
+          <a:p>
+            <a:r>
+              <a:rPr lang="en-US" dirty="0"/>
+              <a:t>Roughly 50-60 million people own some kind of an Xbox device (original, 360, One, &amp; Series X). In this way, they are already in many peoples' </a:t>
+            </a:r>
+            <a:r>
+              <a:rPr lang="en-US" dirty="0" err="1"/>
+              <a:t>livingrooms</a:t>
+            </a:r>
+            <a:r>
+              <a:rPr lang="en-US" dirty="0"/>
+              <a:t>. As a result of this competitive advantage, there may be a lucrative solution for them.</a:t>
+            </a:r>
           </a:p>
         </p:txBody>
       </p:sp>
     </p:spTree>
     <p:extLst>
       <p:ext uri="{BB962C8B-B14F-4D97-AF65-F5344CB8AC3E}">
-        <p14:creationId xmlns:p14="http://schemas.microsoft.com/office/powerpoint/2010/main" val="4015684761"/>
+        <p14:creationId xmlns:p14="http://schemas.microsoft.com/office/powerpoint/2010/main" val="904231667"/>
       </p:ext>
     </p:extLst>
   </p:cSld>
@@ -4080,4 +5008,299 @@
     </a:ext>
   </a:extLst>
 </a:theme>
+</file>
+
+<file path=ppt/theme/theme2.xml><?xml version="1.0" encoding="utf-8"?>
+<a:theme xmlns:a="http://schemas.openxmlformats.org/drawingml/2006/main" name="Office Theme">
+  <a:themeElements>
+    <a:clrScheme name="Office">
+      <a:dk1>
+        <a:sysClr val="windowText" lastClr="000000"/>
+      </a:dk1>
+      <a:lt1>
+        <a:sysClr val="window" lastClr="FFFFFF"/>
+      </a:lt1>
+      <a:dk2>
+        <a:srgbClr val="44546A"/>
+      </a:dk2>
+      <a:lt2>
+        <a:srgbClr val="E7E6E6"/>
+      </a:lt2>
+      <a:accent1>
+        <a:srgbClr val="4472C4"/>
+      </a:accent1>
+      <a:accent2>
+        <a:srgbClr val="ED7D31"/>
+      </a:accent2>
+      <a:accent3>
+        <a:srgbClr val="A5A5A5"/>
+      </a:accent3>
+      <a:accent4>
+        <a:srgbClr val="FFC000"/>
+      </a:accent4>
+      <a:accent5>
+        <a:srgbClr val="5B9BD5"/>
+      </a:accent5>
+      <a:accent6>
+        <a:srgbClr val="70AD47"/>
+      </a:accent6>
+      <a:hlink>
+        <a:srgbClr val="0563C1"/>
+      </a:hlink>
+      <a:folHlink>
+        <a:srgbClr val="954F72"/>
+      </a:folHlink>
+    </a:clrScheme>
+    <a:fontScheme name="Office">
+      <a:majorFont>
+        <a:latin typeface="Calibri Light" panose="020F0302020204030204"/>
+        <a:ea typeface=""/>
+        <a:cs typeface=""/>
+        <a:font script="Jpan" typeface="游ゴシック Light"/>
+        <a:font script="Hang" typeface="맑은 고딕"/>
+        <a:font script="Hans" typeface="等线 Light"/>
+        <a:font script="Hant" typeface="新細明體"/>
+        <a:font script="Arab" typeface="Times New Roman"/>
+        <a:font script="Hebr" typeface="Times New Roman"/>
+        <a:font script="Thai" typeface="Angsana New"/>
+        <a:font script="Ethi" typeface="Nyala"/>
+        <a:font script="Beng" typeface="Vrinda"/>
+        <a:font script="Gujr" typeface="Shruti"/>
+        <a:font script="Khmr" typeface="MoolBoran"/>
+        <a:font script="Knda" typeface="Tunga"/>
+        <a:font script="Guru" typeface="Raavi"/>
+        <a:font script="Cans" typeface="Euphemia"/>
+        <a:font script="Cher" typeface="Plantagenet Cherokee"/>
+        <a:font script="Yiii" typeface="Microsoft Yi Baiti"/>
+        <a:font script="Tibt" typeface="Microsoft Himalaya"/>
+        <a:font script="Thaa" typeface="MV Boli"/>
+        <a:font script="Deva" typeface="Mangal"/>
+        <a:font script="Telu" typeface="Gautami"/>
+        <a:font script="Taml" typeface="Latha"/>
+        <a:font script="Syrc" typeface="Estrangelo Edessa"/>
+        <a:font script="Orya" typeface="Kalinga"/>
+        <a:font script="Mlym" typeface="Kartika"/>
+        <a:font script="Laoo" typeface="DokChampa"/>
+        <a:font script="Sinh" typeface="Iskoola Pota"/>
+        <a:font script="Mong" typeface="Mongolian Baiti"/>
+        <a:font script="Viet" typeface="Times New Roman"/>
+        <a:font script="Uigh" typeface="Microsoft Uighur"/>
+        <a:font script="Geor" typeface="Sylfaen"/>
+        <a:font script="Armn" typeface="Arial"/>
+        <a:font script="Bugi" typeface="Leelawadee UI"/>
+        <a:font script="Bopo" typeface="Microsoft JhengHei"/>
+        <a:font script="Java" typeface="Javanese Text"/>
+        <a:font script="Lisu" typeface="Segoe UI"/>
+        <a:font script="Mymr" typeface="Myanmar Text"/>
+        <a:font script="Nkoo" typeface="Ebrima"/>
+        <a:font script="Olck" typeface="Nirmala UI"/>
+        <a:font script="Osma" typeface="Ebrima"/>
+        <a:font script="Phag" typeface="Phagspa"/>
+        <a:font script="Syrn" typeface="Estrangelo Edessa"/>
+        <a:font script="Syrj" typeface="Estrangelo Edessa"/>
+        <a:font script="Syre" typeface="Estrangelo Edessa"/>
+        <a:font script="Sora" typeface="Nirmala UI"/>
+        <a:font script="Tale" typeface="Microsoft Tai Le"/>
+        <a:font script="Talu" typeface="Microsoft New Tai Lue"/>
+        <a:font script="Tfng" typeface="Ebrima"/>
+      </a:majorFont>
+      <a:minorFont>
+        <a:latin typeface="Calibri" panose="020F0502020204030204"/>
+        <a:ea typeface=""/>
+        <a:cs typeface=""/>
+        <a:font script="Jpan" typeface="游ゴシック"/>
+        <a:font script="Hang" typeface="맑은 고딕"/>
+        <a:font script="Hans" typeface="等线"/>
+        <a:font script="Hant" typeface="新細明體"/>
+        <a:font script="Arab" typeface="Arial"/>
+        <a:font script="Hebr" typeface="Arial"/>
+        <a:font script="Thai" typeface="Cordia New"/>
+        <a:font script="Ethi" typeface="Nyala"/>
+        <a:font script="Beng" typeface="Vrinda"/>
+        <a:font script="Gujr" typeface="Shruti"/>
+        <a:font script="Khmr" typeface="DaunPenh"/>
+        <a:font script="Knda" typeface="Tunga"/>
+        <a:font script="Guru" typeface="Raavi"/>
+        <a:font script="Cans" typeface="Euphemia"/>
+        <a:font script="Cher" typeface="Plantagenet Cherokee"/>
+        <a:font script="Yiii" typeface="Microsoft Yi Baiti"/>
+        <a:font script="Tibt" typeface="Microsoft Himalaya"/>
+        <a:font script="Thaa" typeface="MV Boli"/>
+        <a:font script="Deva" typeface="Mangal"/>
+        <a:font script="Telu" typeface="Gautami"/>
+        <a:font script="Taml" typeface="Latha"/>
+        <a:font script="Syrc" typeface="Estrangelo Edessa"/>
+        <a:font script="Orya" typeface="Kalinga"/>
+        <a:font script="Mlym" typeface="Kartika"/>
+        <a:font script="Laoo" typeface="DokChampa"/>
+        <a:font script="Sinh" typeface="Iskoola Pota"/>
+        <a:font script="Mong" typeface="Mongolian Baiti"/>
+        <a:font script="Viet" typeface="Arial"/>
+        <a:font script="Uigh" typeface="Microsoft Uighur"/>
+        <a:font script="Geor" typeface="Sylfaen"/>
+        <a:font script="Armn" typeface="Arial"/>
+        <a:font script="Bugi" typeface="Leelawadee UI"/>
+        <a:font script="Bopo" typeface="Microsoft JhengHei"/>
+        <a:font script="Java" typeface="Javanese Text"/>
+        <a:font script="Lisu" typeface="Segoe UI"/>
+        <a:font script="Mymr" typeface="Myanmar Text"/>
+        <a:font script="Nkoo" typeface="Ebrima"/>
+        <a:font script="Olck" typeface="Nirmala UI"/>
+        <a:font script="Osma" typeface="Ebrima"/>
+        <a:font script="Phag" typeface="Phagspa"/>
+        <a:font script="Syrn" typeface="Estrangelo Edessa"/>
+        <a:font script="Syrj" typeface="Estrangelo Edessa"/>
+        <a:font script="Syre" typeface="Estrangelo Edessa"/>
+        <a:font script="Sora" typeface="Nirmala UI"/>
+        <a:font script="Tale" typeface="Microsoft Tai Le"/>
+        <a:font script="Talu" typeface="Microsoft New Tai Lue"/>
+        <a:font script="Tfng" typeface="Ebrima"/>
+      </a:minorFont>
+    </a:fontScheme>
+    <a:fmtScheme name="Office">
+      <a:fillStyleLst>
+        <a:solidFill>
+          <a:schemeClr val="phClr"/>
+        </a:solidFill>
+        <a:gradFill rotWithShape="1">
+          <a:gsLst>
+            <a:gs pos="0">
+              <a:schemeClr val="phClr">
+                <a:lumMod val="110000"/>
+                <a:satMod val="105000"/>
+                <a:tint val="67000"/>
+              </a:schemeClr>
+            </a:gs>
+            <a:gs pos="50000">
+              <a:schemeClr val="phClr">
+                <a:lumMod val="105000"/>
+                <a:satMod val="103000"/>
+                <a:tint val="73000"/>
+              </a:schemeClr>
+            </a:gs>
+            <a:gs pos="100000">
+              <a:schemeClr val="phClr">
+                <a:lumMod val="105000"/>
+                <a:satMod val="109000"/>
+                <a:tint val="81000"/>
+              </a:schemeClr>
+            </a:gs>
+          </a:gsLst>
+          <a:lin ang="5400000" scaled="0"/>
+        </a:gradFill>
+        <a:gradFill rotWithShape="1">
+          <a:gsLst>
+            <a:gs pos="0">
+              <a:schemeClr val="phClr">
+                <a:satMod val="103000"/>
+                <a:lumMod val="102000"/>
+                <a:tint val="94000"/>
+              </a:schemeClr>
+            </a:gs>
+            <a:gs pos="50000">
+              <a:schemeClr val="phClr">
+                <a:satMod val="110000"/>
+                <a:lumMod val="100000"/>
+                <a:shade val="100000"/>
+              </a:schemeClr>
+            </a:gs>
+            <a:gs pos="100000">
+              <a:schemeClr val="phClr">
+                <a:lumMod val="99000"/>
+                <a:satMod val="120000"/>
+                <a:shade val="78000"/>
+              </a:schemeClr>
+            </a:gs>
+          </a:gsLst>
+          <a:lin ang="5400000" scaled="0"/>
+        </a:gradFill>
+      </a:fillStyleLst>
+      <a:lnStyleLst>
+        <a:ln w="6350" cap="flat" cmpd="sng" algn="ctr">
+          <a:solidFill>
+            <a:schemeClr val="phClr"/>
+          </a:solidFill>
+          <a:prstDash val="solid"/>
+          <a:miter lim="800000"/>
+        </a:ln>
+        <a:ln w="12700" cap="flat" cmpd="sng" algn="ctr">
+          <a:solidFill>
+            <a:schemeClr val="phClr"/>
+          </a:solidFill>
+          <a:prstDash val="solid"/>
+          <a:miter lim="800000"/>
+        </a:ln>
+        <a:ln w="19050" cap="flat" cmpd="sng" algn="ctr">
+          <a:solidFill>
+            <a:schemeClr val="phClr"/>
+          </a:solidFill>
+          <a:prstDash val="solid"/>
+          <a:miter lim="800000"/>
+        </a:ln>
+      </a:lnStyleLst>
+      <a:effectStyleLst>
+        <a:effectStyle>
+          <a:effectLst/>
+        </a:effectStyle>
+        <a:effectStyle>
+          <a:effectLst/>
+        </a:effectStyle>
+        <a:effectStyle>
+          <a:effectLst>
+            <a:outerShdw blurRad="57150" dist="19050" dir="5400000" algn="ctr" rotWithShape="0">
+              <a:srgbClr val="000000">
+                <a:alpha val="63000"/>
+              </a:srgbClr>
+            </a:outerShdw>
+          </a:effectLst>
+        </a:effectStyle>
+      </a:effectStyleLst>
+      <a:bgFillStyleLst>
+        <a:solidFill>
+          <a:schemeClr val="phClr"/>
+        </a:solidFill>
+        <a:solidFill>
+          <a:schemeClr val="phClr">
+            <a:tint val="95000"/>
+            <a:satMod val="170000"/>
+          </a:schemeClr>
+        </a:solidFill>
+        <a:gradFill rotWithShape="1">
+          <a:gsLst>
+            <a:gs pos="0">
+              <a:schemeClr val="phClr">
+                <a:tint val="93000"/>
+                <a:satMod val="150000"/>
+                <a:shade val="98000"/>
+                <a:lumMod val="102000"/>
+              </a:schemeClr>
+            </a:gs>
+            <a:gs pos="50000">
+              <a:schemeClr val="phClr">
+                <a:tint val="98000"/>
+                <a:satMod val="130000"/>
+                <a:shade val="90000"/>
+                <a:lumMod val="103000"/>
+              </a:schemeClr>
+            </a:gs>
+            <a:gs pos="100000">
+              <a:schemeClr val="phClr">
+                <a:shade val="63000"/>
+                <a:satMod val="120000"/>
+              </a:schemeClr>
+            </a:gs>
+          </a:gsLst>
+          <a:lin ang="5400000" scaled="0"/>
+        </a:gradFill>
+      </a:bgFillStyleLst>
+    </a:fmtScheme>
+  </a:themeElements>
+  <a:objectDefaults/>
+  <a:extraClrSchemeLst/>
+  <a:extLst>
+    <a:ext uri="{05A4C25C-085E-4340-85A3-A5531E510DB2}">
+      <thm15:themeFamily xmlns:thm15="http://schemas.microsoft.com/office/thememl/2012/main" name="Office Theme" id="{62F939B6-93AF-4DB8-9C6B-D6C7DFDC589F}" vid="{4A3C46E8-61CC-4603-A589-7422A47A8E4A}"/>
+    </a:ext>
+  </a:extLst>
+</a:theme>
 </file>
</xml_diff>